<commit_message>
Fixed Assignment 1 links and updated PPTs.
</commit_message>
<xml_diff>
--- a/static/files/microbit/01-Sequencing.pptx
+++ b/static/files/microbit/01-Sequencing.pptx
@@ -17,7 +17,7 @@
     <p:sldId id="362" r:id="rId8"/>
     <p:sldId id="356" r:id="rId9"/>
     <p:sldId id="357" r:id="rId10"/>
-    <p:sldId id="360" r:id="rId11"/>
+    <p:sldId id="376" r:id="rId11"/>
     <p:sldId id="361" r:id="rId12"/>
     <p:sldId id="358" r:id="rId13"/>
     <p:sldId id="359" r:id="rId14"/>
@@ -703,7 +703,7 @@
     </p:spTree>
     <p:extLst>
       <p:ext uri="{BB962C8B-B14F-4D97-AF65-F5344CB8AC3E}">
-        <p14:creationId xmlns:p14="http://schemas.microsoft.com/office/powerpoint/2010/main" val="3162758896"/>
+        <p14:creationId xmlns:p14="http://schemas.microsoft.com/office/powerpoint/2010/main" val="139620818"/>
       </p:ext>
     </p:extLst>
   </p:cSld>
@@ -4239,6 +4239,7 @@
                 <a:solidFill>
                   <a:schemeClr val="lt1"/>
                 </a:solidFill>
+                <a:latin typeface="Atkinson Hyperlegible" pitchFamily="2" charset="0"/>
               </a:rPr>
               <a:t>Lesson 1</a:t>
             </a:r>
@@ -4290,6 +4291,7 @@
                 <a:solidFill>
                   <a:schemeClr val="lt1"/>
                 </a:solidFill>
+                <a:latin typeface="Atkinson Hyperlegible" pitchFamily="2" charset="0"/>
               </a:rPr>
               <a:t>Sequencing</a:t>
             </a:r>
@@ -4337,13 +4339,11 @@
               <a:buFont typeface="Arial"/>
               <a:buNone/>
             </a:pPr>
-            <a:endParaRPr sz="1400" b="0" i="0" u="none" strike="noStrike" cap="none">
+            <a:endParaRPr sz="1400" u="none" strike="noStrike" cap="none">
               <a:solidFill>
                 <a:srgbClr val="000000"/>
               </a:solidFill>
-              <a:latin typeface="Arial"/>
-              <a:ea typeface="Arial"/>
-              <a:cs typeface="Arial"/>
+              <a:latin typeface="Atkinson Hyperlegible" pitchFamily="2" charset="0"/>
               <a:sym typeface="Arial"/>
             </a:endParaRPr>
           </a:p>
@@ -4472,6 +4472,250 @@
           </a:extLst>
         </p:spPr>
       </p:pic>
+      <p:sp>
+        <p:nvSpPr>
+          <p:cNvPr id="2" name="Shape 94">
+            <a:extLst>
+              <a:ext uri="{FF2B5EF4-FFF2-40B4-BE49-F238E27FC236}">
+                <a16:creationId xmlns:a16="http://schemas.microsoft.com/office/drawing/2014/main" id="{A540F4A3-7432-9A2A-25D2-A4B0C812526D}"/>
+              </a:ext>
+            </a:extLst>
+          </p:cNvPr>
+          <p:cNvSpPr txBox="1">
+            <a:spLocks/>
+          </p:cNvSpPr>
+          <p:nvPr/>
+        </p:nvSpPr>
+        <p:spPr>
+          <a:xfrm>
+            <a:off x="175189" y="0"/>
+            <a:ext cx="8229600" cy="683699"/>
+          </a:xfrm>
+          <a:prstGeom prst="rect">
+            <a:avLst/>
+          </a:prstGeom>
+          <a:solidFill>
+            <a:srgbClr val="5CB343"/>
+          </a:solidFill>
+          <a:ln>
+            <a:noFill/>
+          </a:ln>
+        </p:spPr>
+        <p:txBody>
+          <a:bodyPr lIns="91425" tIns="91425" rIns="91425" bIns="91425" anchor="ctr" anchorCtr="0">
+            <a:noAutofit/>
+          </a:bodyPr>
+          <a:lstStyle>
+            <a:defPPr marR="0" lvl="0" algn="l" rtl="0">
+              <a:lnSpc>
+                <a:spcPct val="100000"/>
+              </a:lnSpc>
+              <a:spcBef>
+                <a:spcPts val="0"/>
+              </a:spcBef>
+              <a:spcAft>
+                <a:spcPts val="0"/>
+              </a:spcAft>
+            </a:defPPr>
+            <a:lvl1pPr marL="0" marR="0" lvl="0" indent="0" algn="l" rtl="0">
+              <a:lnSpc>
+                <a:spcPct val="100000"/>
+              </a:lnSpc>
+              <a:spcBef>
+                <a:spcPts val="0"/>
+              </a:spcBef>
+              <a:spcAft>
+                <a:spcPts val="0"/>
+              </a:spcAft>
+              <a:buClr>
+                <a:srgbClr val="FFFFFF"/>
+              </a:buClr>
+              <a:buSzPct val="100000"/>
+              <a:buFont typeface="Ubuntu"/>
+              <a:buNone/>
+              <a:defRPr sz="3000" b="1" i="0" u="none" strike="noStrike" cap="none">
+                <a:solidFill>
+                  <a:srgbClr val="FFFFFF"/>
+                </a:solidFill>
+                <a:latin typeface="Century Gothic" panose="020B0502020202020204" pitchFamily="34" charset="0"/>
+                <a:ea typeface="Century Gothic" panose="020B0502020202020204" pitchFamily="34" charset="0"/>
+                <a:cs typeface="Century Gothic" panose="020B0502020202020204" pitchFamily="34" charset="0"/>
+                <a:sym typeface="Ubuntu"/>
+                <a:rtl val="0"/>
+              </a:defRPr>
+            </a:lvl1pPr>
+            <a:lvl2pPr marL="0" marR="0" lvl="1" indent="0" algn="l" rtl="0">
+              <a:spcBef>
+                <a:spcPts val="0"/>
+              </a:spcBef>
+              <a:buClr>
+                <a:srgbClr val="FFFFFF"/>
+              </a:buClr>
+              <a:buSzPct val="100000"/>
+              <a:buFont typeface="Ubuntu"/>
+              <a:defRPr sz="3000" b="1">
+                <a:solidFill>
+                  <a:srgbClr val="FFFFFF"/>
+                </a:solidFill>
+                <a:latin typeface="Ubuntu"/>
+                <a:ea typeface="Ubuntu"/>
+                <a:cs typeface="Ubuntu"/>
+                <a:sym typeface="Ubuntu"/>
+              </a:defRPr>
+            </a:lvl2pPr>
+            <a:lvl3pPr marL="0" marR="0" lvl="2" indent="0" algn="l" rtl="0">
+              <a:spcBef>
+                <a:spcPts val="0"/>
+              </a:spcBef>
+              <a:buClr>
+                <a:srgbClr val="FFFFFF"/>
+              </a:buClr>
+              <a:buSzPct val="100000"/>
+              <a:buFont typeface="Ubuntu"/>
+              <a:defRPr sz="3000" b="1">
+                <a:solidFill>
+                  <a:srgbClr val="FFFFFF"/>
+                </a:solidFill>
+                <a:latin typeface="Ubuntu"/>
+                <a:ea typeface="Ubuntu"/>
+                <a:cs typeface="Ubuntu"/>
+                <a:sym typeface="Ubuntu"/>
+              </a:defRPr>
+            </a:lvl3pPr>
+            <a:lvl4pPr marL="0" marR="0" lvl="3" indent="0" algn="l" rtl="0">
+              <a:spcBef>
+                <a:spcPts val="0"/>
+              </a:spcBef>
+              <a:buClr>
+                <a:srgbClr val="FFFFFF"/>
+              </a:buClr>
+              <a:buSzPct val="100000"/>
+              <a:buFont typeface="Ubuntu"/>
+              <a:defRPr sz="3000" b="1">
+                <a:solidFill>
+                  <a:srgbClr val="FFFFFF"/>
+                </a:solidFill>
+                <a:latin typeface="Ubuntu"/>
+                <a:ea typeface="Ubuntu"/>
+                <a:cs typeface="Ubuntu"/>
+                <a:sym typeface="Ubuntu"/>
+              </a:defRPr>
+            </a:lvl4pPr>
+            <a:lvl5pPr marL="0" marR="0" lvl="4" indent="0" algn="l" rtl="0">
+              <a:spcBef>
+                <a:spcPts val="0"/>
+              </a:spcBef>
+              <a:buClr>
+                <a:srgbClr val="FFFFFF"/>
+              </a:buClr>
+              <a:buSzPct val="100000"/>
+              <a:buFont typeface="Ubuntu"/>
+              <a:defRPr sz="3000" b="1">
+                <a:solidFill>
+                  <a:srgbClr val="FFFFFF"/>
+                </a:solidFill>
+                <a:latin typeface="Ubuntu"/>
+                <a:ea typeface="Ubuntu"/>
+                <a:cs typeface="Ubuntu"/>
+                <a:sym typeface="Ubuntu"/>
+              </a:defRPr>
+            </a:lvl5pPr>
+            <a:lvl6pPr marL="0" marR="0" lvl="5" indent="0" algn="l" rtl="0">
+              <a:spcBef>
+                <a:spcPts val="0"/>
+              </a:spcBef>
+              <a:buClr>
+                <a:srgbClr val="FFFFFF"/>
+              </a:buClr>
+              <a:buSzPct val="100000"/>
+              <a:buFont typeface="Ubuntu"/>
+              <a:defRPr sz="3000" b="1">
+                <a:solidFill>
+                  <a:srgbClr val="FFFFFF"/>
+                </a:solidFill>
+                <a:latin typeface="Ubuntu"/>
+                <a:ea typeface="Ubuntu"/>
+                <a:cs typeface="Ubuntu"/>
+                <a:sym typeface="Ubuntu"/>
+              </a:defRPr>
+            </a:lvl6pPr>
+            <a:lvl7pPr marL="0" marR="0" lvl="6" indent="0" algn="l" rtl="0">
+              <a:spcBef>
+                <a:spcPts val="0"/>
+              </a:spcBef>
+              <a:buClr>
+                <a:srgbClr val="FFFFFF"/>
+              </a:buClr>
+              <a:buSzPct val="100000"/>
+              <a:buFont typeface="Ubuntu"/>
+              <a:defRPr sz="3000" b="1">
+                <a:solidFill>
+                  <a:srgbClr val="FFFFFF"/>
+                </a:solidFill>
+                <a:latin typeface="Ubuntu"/>
+                <a:ea typeface="Ubuntu"/>
+                <a:cs typeface="Ubuntu"/>
+                <a:sym typeface="Ubuntu"/>
+              </a:defRPr>
+            </a:lvl7pPr>
+            <a:lvl8pPr marL="0" marR="0" lvl="7" indent="0" algn="l" rtl="0">
+              <a:spcBef>
+                <a:spcPts val="0"/>
+              </a:spcBef>
+              <a:buClr>
+                <a:srgbClr val="FFFFFF"/>
+              </a:buClr>
+              <a:buSzPct val="100000"/>
+              <a:buFont typeface="Ubuntu"/>
+              <a:defRPr sz="3000" b="1">
+                <a:solidFill>
+                  <a:srgbClr val="FFFFFF"/>
+                </a:solidFill>
+                <a:latin typeface="Ubuntu"/>
+                <a:ea typeface="Ubuntu"/>
+                <a:cs typeface="Ubuntu"/>
+                <a:sym typeface="Ubuntu"/>
+              </a:defRPr>
+            </a:lvl8pPr>
+            <a:lvl9pPr marL="0" marR="0" lvl="8" indent="0" algn="l" rtl="0">
+              <a:spcBef>
+                <a:spcPts val="0"/>
+              </a:spcBef>
+              <a:buClr>
+                <a:srgbClr val="FFFFFF"/>
+              </a:buClr>
+              <a:buSzPct val="100000"/>
+              <a:buFont typeface="Ubuntu"/>
+              <a:defRPr sz="3000" b="1">
+                <a:solidFill>
+                  <a:srgbClr val="FFFFFF"/>
+                </a:solidFill>
+                <a:latin typeface="Ubuntu"/>
+                <a:ea typeface="Ubuntu"/>
+                <a:cs typeface="Ubuntu"/>
+                <a:sym typeface="Ubuntu"/>
+              </a:defRPr>
+            </a:lvl9pPr>
+          </a:lstStyle>
+          <a:p>
+            <a:r>
+              <a:rPr lang="en-GB" b="0" dirty="0">
+                <a:latin typeface="Atkinson Hyperlegible" pitchFamily="2" charset="0"/>
+              </a:rPr>
+              <a:t>BBC </a:t>
+            </a:r>
+            <a:r>
+              <a:rPr lang="en-GB" b="0" dirty="0" err="1">
+                <a:latin typeface="Atkinson Hyperlegible" pitchFamily="2" charset="0"/>
+              </a:rPr>
+              <a:t>Micro:bit</a:t>
+            </a:r>
+            <a:endParaRPr lang="en-GB" b="0" dirty="0">
+              <a:latin typeface="Atkinson Hyperlegible" pitchFamily="2" charset="0"/>
+            </a:endParaRPr>
+          </a:p>
+        </p:txBody>
+      </p:sp>
     </p:spTree>
   </p:cSld>
   <p:clrMapOvr>
@@ -4532,7 +4776,9 @@
               <a:buNone/>
             </a:pPr>
             <a:r>
-              <a:rPr lang="en-GB" dirty="0"/>
+              <a:rPr lang="en-GB" dirty="0">
+                <a:latin typeface="Atkinson Hyperlegible" pitchFamily="2" charset="0"/>
+              </a:rPr>
               <a:t>Built In Images</a:t>
             </a:r>
           </a:p>
@@ -4569,7 +4815,7 @@
           </a:bodyPr>
           <a:lstStyle/>
           <a:p>
-            <a:pPr lvl="0" algn="ctr">
+            <a:pPr lvl="0">
               <a:buClr>
                 <a:srgbClr val="003565"/>
               </a:buClr>
@@ -4580,7 +4826,7 @@
                 <a:solidFill>
                   <a:schemeClr val="tx1"/>
                 </a:solidFill>
-                <a:latin typeface="Century Gothic" panose="020B0502020202020204" pitchFamily="34" charset="0"/>
+                <a:latin typeface="Atkinson Hyperlegible" pitchFamily="2" charset="0"/>
                 <a:ea typeface="Ubuntu"/>
                 <a:cs typeface="Ubuntu"/>
                 <a:sym typeface="Ubuntu"/>
@@ -4621,7 +4867,7 @@
           </a:bodyPr>
           <a:lstStyle/>
           <a:p>
-            <a:pPr lvl="0" algn="ctr">
+            <a:pPr lvl="0">
               <a:buClr>
                 <a:srgbClr val="003565"/>
               </a:buClr>
@@ -4632,16 +4878,16 @@
                 <a:solidFill>
                   <a:schemeClr val="tx1"/>
                 </a:solidFill>
-                <a:latin typeface="Century Gothic" panose="020B0502020202020204" pitchFamily="34" charset="0"/>
-                <a:ea typeface="Ubuntu"/>
-                <a:cs typeface="Ubuntu"/>
+                <a:latin typeface="Consolas" panose="020B0609020204030204" pitchFamily="49" charset="0"/>
+                <a:ea typeface="Ubuntu"/>
+                <a:cs typeface="Consolas" panose="020B0609020204030204" pitchFamily="49" charset="0"/>
                 <a:sym typeface="Ubuntu"/>
               </a:rPr>
               <a:t>Image.HEART</a:t>
             </a:r>
           </a:p>
           <a:p>
-            <a:pPr lvl="0" algn="ctr">
+            <a:pPr lvl="0">
               <a:buClr>
                 <a:srgbClr val="003565"/>
               </a:buClr>
@@ -4652,16 +4898,16 @@
                 <a:solidFill>
                   <a:schemeClr val="tx1"/>
                 </a:solidFill>
-                <a:latin typeface="Century Gothic" panose="020B0502020202020204" pitchFamily="34" charset="0"/>
-                <a:ea typeface="Ubuntu"/>
-                <a:cs typeface="Ubuntu"/>
+                <a:latin typeface="Consolas" panose="020B0609020204030204" pitchFamily="49" charset="0"/>
+                <a:ea typeface="Ubuntu"/>
+                <a:cs typeface="Consolas" panose="020B0609020204030204" pitchFamily="49" charset="0"/>
                 <a:sym typeface="Ubuntu"/>
               </a:rPr>
               <a:t>Image.HEART_SMALL</a:t>
             </a:r>
           </a:p>
           <a:p>
-            <a:pPr lvl="0" algn="ctr">
+            <a:pPr lvl="0">
               <a:buClr>
                 <a:srgbClr val="003565"/>
               </a:buClr>
@@ -4672,16 +4918,16 @@
                 <a:solidFill>
                   <a:schemeClr val="tx1"/>
                 </a:solidFill>
-                <a:latin typeface="Century Gothic" panose="020B0502020202020204" pitchFamily="34" charset="0"/>
-                <a:ea typeface="Ubuntu"/>
-                <a:cs typeface="Ubuntu"/>
+                <a:latin typeface="Consolas" panose="020B0609020204030204" pitchFamily="49" charset="0"/>
+                <a:ea typeface="Ubuntu"/>
+                <a:cs typeface="Consolas" panose="020B0609020204030204" pitchFamily="49" charset="0"/>
                 <a:sym typeface="Ubuntu"/>
               </a:rPr>
               <a:t>Image.HAPPY</a:t>
             </a:r>
           </a:p>
           <a:p>
-            <a:pPr lvl="0" algn="ctr">
+            <a:pPr lvl="0">
               <a:buClr>
                 <a:srgbClr val="003565"/>
               </a:buClr>
@@ -4692,16 +4938,16 @@
                 <a:solidFill>
                   <a:schemeClr val="tx1"/>
                 </a:solidFill>
-                <a:latin typeface="Century Gothic" panose="020B0502020202020204" pitchFamily="34" charset="0"/>
-                <a:ea typeface="Ubuntu"/>
-                <a:cs typeface="Ubuntu"/>
+                <a:latin typeface="Consolas" panose="020B0609020204030204" pitchFamily="49" charset="0"/>
+                <a:ea typeface="Ubuntu"/>
+                <a:cs typeface="Consolas" panose="020B0609020204030204" pitchFamily="49" charset="0"/>
                 <a:sym typeface="Ubuntu"/>
               </a:rPr>
               <a:t>Image.SMILE</a:t>
             </a:r>
           </a:p>
           <a:p>
-            <a:pPr lvl="0" algn="ctr">
+            <a:pPr lvl="0">
               <a:buClr>
                 <a:srgbClr val="003565"/>
               </a:buClr>
@@ -4712,16 +4958,16 @@
                 <a:solidFill>
                   <a:schemeClr val="tx1"/>
                 </a:solidFill>
-                <a:latin typeface="Century Gothic" panose="020B0502020202020204" pitchFamily="34" charset="0"/>
-                <a:ea typeface="Ubuntu"/>
-                <a:cs typeface="Ubuntu"/>
+                <a:latin typeface="Consolas" panose="020B0609020204030204" pitchFamily="49" charset="0"/>
+                <a:ea typeface="Ubuntu"/>
+                <a:cs typeface="Consolas" panose="020B0609020204030204" pitchFamily="49" charset="0"/>
                 <a:sym typeface="Ubuntu"/>
               </a:rPr>
               <a:t>Image.SAD</a:t>
             </a:r>
           </a:p>
           <a:p>
-            <a:pPr lvl="0" algn="ctr">
+            <a:pPr lvl="0">
               <a:buClr>
                 <a:srgbClr val="003565"/>
               </a:buClr>
@@ -4732,16 +4978,16 @@
                 <a:solidFill>
                   <a:schemeClr val="tx1"/>
                 </a:solidFill>
-                <a:latin typeface="Century Gothic" panose="020B0502020202020204" pitchFamily="34" charset="0"/>
-                <a:ea typeface="Ubuntu"/>
-                <a:cs typeface="Ubuntu"/>
+                <a:latin typeface="Consolas" panose="020B0609020204030204" pitchFamily="49" charset="0"/>
+                <a:ea typeface="Ubuntu"/>
+                <a:cs typeface="Consolas" panose="020B0609020204030204" pitchFamily="49" charset="0"/>
                 <a:sym typeface="Ubuntu"/>
               </a:rPr>
               <a:t>Image.CONFUSED</a:t>
             </a:r>
           </a:p>
           <a:p>
-            <a:pPr lvl="0" algn="ctr">
+            <a:pPr lvl="0">
               <a:buClr>
                 <a:srgbClr val="003565"/>
               </a:buClr>
@@ -4752,16 +4998,16 @@
                 <a:solidFill>
                   <a:schemeClr val="tx1"/>
                 </a:solidFill>
-                <a:latin typeface="Century Gothic" panose="020B0502020202020204" pitchFamily="34" charset="0"/>
-                <a:ea typeface="Ubuntu"/>
-                <a:cs typeface="Ubuntu"/>
+                <a:latin typeface="Consolas" panose="020B0609020204030204" pitchFamily="49" charset="0"/>
+                <a:ea typeface="Ubuntu"/>
+                <a:cs typeface="Consolas" panose="020B0609020204030204" pitchFamily="49" charset="0"/>
                 <a:sym typeface="Ubuntu"/>
               </a:rPr>
               <a:t>Image.ANGRY</a:t>
             </a:r>
           </a:p>
           <a:p>
-            <a:pPr lvl="0" algn="ctr">
+            <a:pPr lvl="0">
               <a:buClr>
                 <a:srgbClr val="003565"/>
               </a:buClr>
@@ -4772,16 +5018,16 @@
                 <a:solidFill>
                   <a:schemeClr val="tx1"/>
                 </a:solidFill>
-                <a:latin typeface="Century Gothic" panose="020B0502020202020204" pitchFamily="34" charset="0"/>
-                <a:ea typeface="Ubuntu"/>
-                <a:cs typeface="Ubuntu"/>
+                <a:latin typeface="Consolas" panose="020B0609020204030204" pitchFamily="49" charset="0"/>
+                <a:ea typeface="Ubuntu"/>
+                <a:cs typeface="Consolas" panose="020B0609020204030204" pitchFamily="49" charset="0"/>
                 <a:sym typeface="Ubuntu"/>
               </a:rPr>
               <a:t>Image.ASLEEP</a:t>
             </a:r>
           </a:p>
           <a:p>
-            <a:pPr lvl="0" algn="ctr">
+            <a:pPr lvl="0">
               <a:buClr>
                 <a:srgbClr val="003565"/>
               </a:buClr>
@@ -4792,16 +5038,16 @@
                 <a:solidFill>
                   <a:schemeClr val="tx1"/>
                 </a:solidFill>
-                <a:latin typeface="Century Gothic" panose="020B0502020202020204" pitchFamily="34" charset="0"/>
-                <a:ea typeface="Ubuntu"/>
-                <a:cs typeface="Ubuntu"/>
+                <a:latin typeface="Consolas" panose="020B0609020204030204" pitchFamily="49" charset="0"/>
+                <a:ea typeface="Ubuntu"/>
+                <a:cs typeface="Consolas" panose="020B0609020204030204" pitchFamily="49" charset="0"/>
                 <a:sym typeface="Ubuntu"/>
               </a:rPr>
               <a:t>Image.SURPRISED</a:t>
             </a:r>
           </a:p>
           <a:p>
-            <a:pPr lvl="0" algn="ctr">
+            <a:pPr lvl="0">
               <a:buClr>
                 <a:srgbClr val="003565"/>
               </a:buClr>
@@ -4812,16 +5058,16 @@
                 <a:solidFill>
                   <a:schemeClr val="tx1"/>
                 </a:solidFill>
-                <a:latin typeface="Century Gothic" panose="020B0502020202020204" pitchFamily="34" charset="0"/>
-                <a:ea typeface="Ubuntu"/>
-                <a:cs typeface="Ubuntu"/>
+                <a:latin typeface="Consolas" panose="020B0609020204030204" pitchFamily="49" charset="0"/>
+                <a:ea typeface="Ubuntu"/>
+                <a:cs typeface="Consolas" panose="020B0609020204030204" pitchFamily="49" charset="0"/>
                 <a:sym typeface="Ubuntu"/>
               </a:rPr>
               <a:t>Image.SILLY</a:t>
             </a:r>
           </a:p>
           <a:p>
-            <a:pPr lvl="0" algn="ctr">
+            <a:pPr lvl="0">
               <a:buClr>
                 <a:srgbClr val="003565"/>
               </a:buClr>
@@ -4832,16 +5078,16 @@
                 <a:solidFill>
                   <a:schemeClr val="tx1"/>
                 </a:solidFill>
-                <a:latin typeface="Century Gothic" panose="020B0502020202020204" pitchFamily="34" charset="0"/>
-                <a:ea typeface="Ubuntu"/>
-                <a:cs typeface="Ubuntu"/>
+                <a:latin typeface="Consolas" panose="020B0609020204030204" pitchFamily="49" charset="0"/>
+                <a:ea typeface="Ubuntu"/>
+                <a:cs typeface="Consolas" panose="020B0609020204030204" pitchFamily="49" charset="0"/>
                 <a:sym typeface="Ubuntu"/>
               </a:rPr>
               <a:t>Image.FABULOUS</a:t>
             </a:r>
           </a:p>
           <a:p>
-            <a:pPr lvl="0" algn="ctr">
+            <a:pPr lvl="0">
               <a:buClr>
                 <a:srgbClr val="003565"/>
               </a:buClr>
@@ -4852,16 +5098,16 @@
                 <a:solidFill>
                   <a:schemeClr val="tx1"/>
                 </a:solidFill>
-                <a:latin typeface="Century Gothic" panose="020B0502020202020204" pitchFamily="34" charset="0"/>
-                <a:ea typeface="Ubuntu"/>
-                <a:cs typeface="Ubuntu"/>
+                <a:latin typeface="Consolas" panose="020B0609020204030204" pitchFamily="49" charset="0"/>
+                <a:ea typeface="Ubuntu"/>
+                <a:cs typeface="Consolas" panose="020B0609020204030204" pitchFamily="49" charset="0"/>
                 <a:sym typeface="Ubuntu"/>
               </a:rPr>
               <a:t>Image.MEH</a:t>
             </a:r>
           </a:p>
           <a:p>
-            <a:pPr lvl="0" algn="ctr">
+            <a:pPr lvl="0">
               <a:buClr>
                 <a:srgbClr val="003565"/>
               </a:buClr>
@@ -4872,16 +5118,16 @@
                 <a:solidFill>
                   <a:schemeClr val="tx1"/>
                 </a:solidFill>
-                <a:latin typeface="Century Gothic" panose="020B0502020202020204" pitchFamily="34" charset="0"/>
-                <a:ea typeface="Ubuntu"/>
-                <a:cs typeface="Ubuntu"/>
+                <a:latin typeface="Consolas" panose="020B0609020204030204" pitchFamily="49" charset="0"/>
+                <a:ea typeface="Ubuntu"/>
+                <a:cs typeface="Consolas" panose="020B0609020204030204" pitchFamily="49" charset="0"/>
                 <a:sym typeface="Ubuntu"/>
               </a:rPr>
               <a:t>Image.YES</a:t>
             </a:r>
           </a:p>
           <a:p>
-            <a:pPr lvl="0" algn="ctr">
+            <a:pPr lvl="0">
               <a:buClr>
                 <a:srgbClr val="003565"/>
               </a:buClr>
@@ -4892,16 +5138,16 @@
                 <a:solidFill>
                   <a:schemeClr val="tx1"/>
                 </a:solidFill>
-                <a:latin typeface="Century Gothic" panose="020B0502020202020204" pitchFamily="34" charset="0"/>
-                <a:ea typeface="Ubuntu"/>
-                <a:cs typeface="Ubuntu"/>
+                <a:latin typeface="Consolas" panose="020B0609020204030204" pitchFamily="49" charset="0"/>
+                <a:ea typeface="Ubuntu"/>
+                <a:cs typeface="Consolas" panose="020B0609020204030204" pitchFamily="49" charset="0"/>
                 <a:sym typeface="Ubuntu"/>
               </a:rPr>
               <a:t>Image.NO</a:t>
             </a:r>
           </a:p>
           <a:p>
-            <a:pPr algn="ctr">
+            <a:pPr>
               <a:buClr>
                 <a:srgbClr val="003565"/>
               </a:buClr>
@@ -4912,9 +5158,9 @@
                 <a:solidFill>
                   <a:schemeClr val="tx1"/>
                 </a:solidFill>
-                <a:latin typeface="Century Gothic" panose="020B0502020202020204" pitchFamily="34" charset="0"/>
-                <a:ea typeface="Ubuntu"/>
-                <a:cs typeface="Ubuntu"/>
+                <a:latin typeface="Consolas" panose="020B0609020204030204" pitchFamily="49" charset="0"/>
+                <a:ea typeface="Ubuntu"/>
+                <a:cs typeface="Consolas" panose="020B0609020204030204" pitchFamily="49" charset="0"/>
                 <a:sym typeface="Ubuntu"/>
               </a:rPr>
               <a:t>Image.TRIANGLE</a:t>
@@ -4953,7 +5199,7 @@
           </a:bodyPr>
           <a:lstStyle/>
           <a:p>
-            <a:pPr lvl="0" algn="ctr">
+            <a:pPr lvl="0">
               <a:buClr>
                 <a:srgbClr val="003565"/>
               </a:buClr>
@@ -4964,16 +5210,16 @@
                 <a:solidFill>
                   <a:schemeClr val="tx1"/>
                 </a:solidFill>
-                <a:latin typeface="Century Gothic" panose="020B0502020202020204" pitchFamily="34" charset="0"/>
-                <a:ea typeface="Ubuntu"/>
-                <a:cs typeface="Ubuntu"/>
+                <a:latin typeface="Consolas" panose="020B0609020204030204" pitchFamily="49" charset="0"/>
+                <a:ea typeface="Ubuntu"/>
+                <a:cs typeface="Consolas" panose="020B0609020204030204" pitchFamily="49" charset="0"/>
                 <a:sym typeface="Ubuntu"/>
               </a:rPr>
               <a:t>Image.TRIANGLE_LEFT</a:t>
             </a:r>
           </a:p>
           <a:p>
-            <a:pPr lvl="0" algn="ctr">
+            <a:pPr lvl="0">
               <a:buClr>
                 <a:srgbClr val="003565"/>
               </a:buClr>
@@ -4984,16 +5230,16 @@
                 <a:solidFill>
                   <a:schemeClr val="tx1"/>
                 </a:solidFill>
-                <a:latin typeface="Century Gothic" panose="020B0502020202020204" pitchFamily="34" charset="0"/>
-                <a:ea typeface="Ubuntu"/>
-                <a:cs typeface="Ubuntu"/>
+                <a:latin typeface="Consolas" panose="020B0609020204030204" pitchFamily="49" charset="0"/>
+                <a:ea typeface="Ubuntu"/>
+                <a:cs typeface="Consolas" panose="020B0609020204030204" pitchFamily="49" charset="0"/>
                 <a:sym typeface="Ubuntu"/>
               </a:rPr>
               <a:t>Image.CHESSBOARD</a:t>
             </a:r>
           </a:p>
           <a:p>
-            <a:pPr lvl="0" algn="ctr">
+            <a:pPr lvl="0">
               <a:buClr>
                 <a:srgbClr val="003565"/>
               </a:buClr>
@@ -5004,16 +5250,16 @@
                 <a:solidFill>
                   <a:schemeClr val="tx1"/>
                 </a:solidFill>
-                <a:latin typeface="Century Gothic" panose="020B0502020202020204" pitchFamily="34" charset="0"/>
-                <a:ea typeface="Ubuntu"/>
-                <a:cs typeface="Ubuntu"/>
+                <a:latin typeface="Consolas" panose="020B0609020204030204" pitchFamily="49" charset="0"/>
+                <a:ea typeface="Ubuntu"/>
+                <a:cs typeface="Consolas" panose="020B0609020204030204" pitchFamily="49" charset="0"/>
                 <a:sym typeface="Ubuntu"/>
               </a:rPr>
               <a:t>Image.DIAMOND</a:t>
             </a:r>
           </a:p>
           <a:p>
-            <a:pPr lvl="0" algn="ctr">
+            <a:pPr lvl="0">
               <a:buClr>
                 <a:srgbClr val="003565"/>
               </a:buClr>
@@ -5024,16 +5270,16 @@
                 <a:solidFill>
                   <a:schemeClr val="tx1"/>
                 </a:solidFill>
-                <a:latin typeface="Century Gothic" panose="020B0502020202020204" pitchFamily="34" charset="0"/>
-                <a:ea typeface="Ubuntu"/>
-                <a:cs typeface="Ubuntu"/>
+                <a:latin typeface="Consolas" panose="020B0609020204030204" pitchFamily="49" charset="0"/>
+                <a:ea typeface="Ubuntu"/>
+                <a:cs typeface="Consolas" panose="020B0609020204030204" pitchFamily="49" charset="0"/>
                 <a:sym typeface="Ubuntu"/>
               </a:rPr>
               <a:t>Image.DIAMOND_SMALL</a:t>
             </a:r>
           </a:p>
           <a:p>
-            <a:pPr lvl="0" algn="ctr">
+            <a:pPr lvl="0">
               <a:buClr>
                 <a:srgbClr val="003565"/>
               </a:buClr>
@@ -5044,16 +5290,16 @@
                 <a:solidFill>
                   <a:schemeClr val="tx1"/>
                 </a:solidFill>
-                <a:latin typeface="Century Gothic" panose="020B0502020202020204" pitchFamily="34" charset="0"/>
-                <a:ea typeface="Ubuntu"/>
-                <a:cs typeface="Ubuntu"/>
+                <a:latin typeface="Consolas" panose="020B0609020204030204" pitchFamily="49" charset="0"/>
+                <a:ea typeface="Ubuntu"/>
+                <a:cs typeface="Consolas" panose="020B0609020204030204" pitchFamily="49" charset="0"/>
                 <a:sym typeface="Ubuntu"/>
               </a:rPr>
               <a:t>Image.SQUARE</a:t>
             </a:r>
           </a:p>
           <a:p>
-            <a:pPr algn="ctr">
+            <a:pPr>
               <a:buClr>
                 <a:srgbClr val="003565"/>
               </a:buClr>
@@ -5064,16 +5310,16 @@
                 <a:solidFill>
                   <a:schemeClr val="tx1"/>
                 </a:solidFill>
-                <a:latin typeface="Century Gothic" panose="020B0502020202020204" pitchFamily="34" charset="0"/>
-                <a:ea typeface="Ubuntu"/>
-                <a:cs typeface="Ubuntu"/>
+                <a:latin typeface="Consolas" panose="020B0609020204030204" pitchFamily="49" charset="0"/>
+                <a:ea typeface="Ubuntu"/>
+                <a:cs typeface="Consolas" panose="020B0609020204030204" pitchFamily="49" charset="0"/>
                 <a:sym typeface="Ubuntu"/>
               </a:rPr>
               <a:t>Image.SQUARE_SMALL</a:t>
             </a:r>
           </a:p>
           <a:p>
-            <a:pPr lvl="0" algn="ctr">
+            <a:pPr lvl="0">
               <a:buClr>
                 <a:srgbClr val="003565"/>
               </a:buClr>
@@ -5084,16 +5330,16 @@
                 <a:solidFill>
                   <a:schemeClr val="tx1"/>
                 </a:solidFill>
-                <a:latin typeface="Century Gothic" panose="020B0502020202020204" pitchFamily="34" charset="0"/>
-                <a:ea typeface="Ubuntu"/>
-                <a:cs typeface="Ubuntu"/>
+                <a:latin typeface="Consolas" panose="020B0609020204030204" pitchFamily="49" charset="0"/>
+                <a:ea typeface="Ubuntu"/>
+                <a:cs typeface="Consolas" panose="020B0609020204030204" pitchFamily="49" charset="0"/>
                 <a:sym typeface="Ubuntu"/>
               </a:rPr>
               <a:t>Image.RABBIT</a:t>
             </a:r>
           </a:p>
           <a:p>
-            <a:pPr lvl="0" algn="ctr">
+            <a:pPr lvl="0">
               <a:buClr>
                 <a:srgbClr val="003565"/>
               </a:buClr>
@@ -5104,16 +5350,16 @@
                 <a:solidFill>
                   <a:schemeClr val="tx1"/>
                 </a:solidFill>
-                <a:latin typeface="Century Gothic" panose="020B0502020202020204" pitchFamily="34" charset="0"/>
-                <a:ea typeface="Ubuntu"/>
-                <a:cs typeface="Ubuntu"/>
+                <a:latin typeface="Consolas" panose="020B0609020204030204" pitchFamily="49" charset="0"/>
+                <a:ea typeface="Ubuntu"/>
+                <a:cs typeface="Consolas" panose="020B0609020204030204" pitchFamily="49" charset="0"/>
                 <a:sym typeface="Ubuntu"/>
               </a:rPr>
               <a:t>Image.COW</a:t>
             </a:r>
           </a:p>
           <a:p>
-            <a:pPr lvl="0" algn="ctr">
+            <a:pPr lvl="0">
               <a:buClr>
                 <a:srgbClr val="003565"/>
               </a:buClr>
@@ -5124,16 +5370,16 @@
                 <a:solidFill>
                   <a:schemeClr val="tx1"/>
                 </a:solidFill>
-                <a:latin typeface="Century Gothic" panose="020B0502020202020204" pitchFamily="34" charset="0"/>
-                <a:ea typeface="Ubuntu"/>
-                <a:cs typeface="Ubuntu"/>
+                <a:latin typeface="Consolas" panose="020B0609020204030204" pitchFamily="49" charset="0"/>
+                <a:ea typeface="Ubuntu"/>
+                <a:cs typeface="Consolas" panose="020B0609020204030204" pitchFamily="49" charset="0"/>
                 <a:sym typeface="Ubuntu"/>
               </a:rPr>
               <a:t>Image.MUSIC_CROTCHET</a:t>
             </a:r>
           </a:p>
           <a:p>
-            <a:pPr lvl="0" algn="ctr">
+            <a:pPr lvl="0">
               <a:buClr>
                 <a:srgbClr val="003565"/>
               </a:buClr>
@@ -5144,16 +5390,16 @@
                 <a:solidFill>
                   <a:schemeClr val="tx1"/>
                 </a:solidFill>
-                <a:latin typeface="Century Gothic" panose="020B0502020202020204" pitchFamily="34" charset="0"/>
-                <a:ea typeface="Ubuntu"/>
-                <a:cs typeface="Ubuntu"/>
+                <a:latin typeface="Consolas" panose="020B0609020204030204" pitchFamily="49" charset="0"/>
+                <a:ea typeface="Ubuntu"/>
+                <a:cs typeface="Consolas" panose="020B0609020204030204" pitchFamily="49" charset="0"/>
                 <a:sym typeface="Ubuntu"/>
               </a:rPr>
               <a:t>Image.MUSIC_QUAVER</a:t>
             </a:r>
           </a:p>
           <a:p>
-            <a:pPr lvl="0" algn="ctr">
+            <a:pPr lvl="0">
               <a:buClr>
                 <a:srgbClr val="003565"/>
               </a:buClr>
@@ -5164,16 +5410,16 @@
                 <a:solidFill>
                   <a:schemeClr val="tx1"/>
                 </a:solidFill>
-                <a:latin typeface="Century Gothic" panose="020B0502020202020204" pitchFamily="34" charset="0"/>
-                <a:ea typeface="Ubuntu"/>
-                <a:cs typeface="Ubuntu"/>
+                <a:latin typeface="Consolas" panose="020B0609020204030204" pitchFamily="49" charset="0"/>
+                <a:ea typeface="Ubuntu"/>
+                <a:cs typeface="Consolas" panose="020B0609020204030204" pitchFamily="49" charset="0"/>
                 <a:sym typeface="Ubuntu"/>
               </a:rPr>
               <a:t>Image.MUSIC_QUAVERS</a:t>
             </a:r>
           </a:p>
           <a:p>
-            <a:pPr lvl="0" algn="ctr">
+            <a:pPr lvl="0">
               <a:buClr>
                 <a:srgbClr val="003565"/>
               </a:buClr>
@@ -5184,16 +5430,16 @@
                 <a:solidFill>
                   <a:schemeClr val="tx1"/>
                 </a:solidFill>
-                <a:latin typeface="Century Gothic" panose="020B0502020202020204" pitchFamily="34" charset="0"/>
-                <a:ea typeface="Ubuntu"/>
-                <a:cs typeface="Ubuntu"/>
+                <a:latin typeface="Consolas" panose="020B0609020204030204" pitchFamily="49" charset="0"/>
+                <a:ea typeface="Ubuntu"/>
+                <a:cs typeface="Consolas" panose="020B0609020204030204" pitchFamily="49" charset="0"/>
                 <a:sym typeface="Ubuntu"/>
               </a:rPr>
               <a:t>Image.PITCHFORK</a:t>
             </a:r>
           </a:p>
           <a:p>
-            <a:pPr lvl="0" algn="ctr">
+            <a:pPr lvl="0">
               <a:buClr>
                 <a:srgbClr val="003565"/>
               </a:buClr>
@@ -5204,16 +5450,16 @@
                 <a:solidFill>
                   <a:schemeClr val="tx1"/>
                 </a:solidFill>
-                <a:latin typeface="Century Gothic" panose="020B0502020202020204" pitchFamily="34" charset="0"/>
-                <a:ea typeface="Ubuntu"/>
-                <a:cs typeface="Ubuntu"/>
+                <a:latin typeface="Consolas" panose="020B0609020204030204" pitchFamily="49" charset="0"/>
+                <a:ea typeface="Ubuntu"/>
+                <a:cs typeface="Consolas" panose="020B0609020204030204" pitchFamily="49" charset="0"/>
                 <a:sym typeface="Ubuntu"/>
               </a:rPr>
               <a:t>Image.XMAS</a:t>
             </a:r>
           </a:p>
           <a:p>
-            <a:pPr lvl="0" algn="ctr">
+            <a:pPr lvl="0">
               <a:buClr>
                 <a:srgbClr val="003565"/>
               </a:buClr>
@@ -5224,9 +5470,9 @@
                 <a:solidFill>
                   <a:schemeClr val="tx1"/>
                 </a:solidFill>
-                <a:latin typeface="Century Gothic" panose="020B0502020202020204" pitchFamily="34" charset="0"/>
-                <a:ea typeface="Ubuntu"/>
-                <a:cs typeface="Ubuntu"/>
+                <a:latin typeface="Consolas" panose="020B0609020204030204" pitchFamily="49" charset="0"/>
+                <a:ea typeface="Ubuntu"/>
+                <a:cs typeface="Consolas" panose="020B0609020204030204" pitchFamily="49" charset="0"/>
                 <a:sym typeface="Ubuntu"/>
               </a:rPr>
               <a:t>Image.PACMAN</a:t>
@@ -5265,7 +5511,7 @@
           </a:bodyPr>
           <a:lstStyle/>
           <a:p>
-            <a:pPr algn="ctr">
+            <a:pPr>
               <a:buClr>
                 <a:srgbClr val="003565"/>
               </a:buClr>
@@ -5276,16 +5522,16 @@
                 <a:solidFill>
                   <a:schemeClr val="tx1"/>
                 </a:solidFill>
-                <a:latin typeface="Century Gothic" panose="020B0502020202020204" pitchFamily="34" charset="0"/>
-                <a:ea typeface="Ubuntu"/>
-                <a:cs typeface="Ubuntu"/>
+                <a:latin typeface="Consolas" panose="020B0609020204030204" pitchFamily="49" charset="0"/>
+                <a:ea typeface="Ubuntu"/>
+                <a:cs typeface="Consolas" panose="020B0609020204030204" pitchFamily="49" charset="0"/>
                 <a:sym typeface="Ubuntu"/>
               </a:rPr>
               <a:t>Image.TARGET</a:t>
             </a:r>
           </a:p>
           <a:p>
-            <a:pPr lvl="0" algn="ctr">
+            <a:pPr lvl="0">
               <a:buClr>
                 <a:srgbClr val="003565"/>
               </a:buClr>
@@ -5296,16 +5542,16 @@
                 <a:solidFill>
                   <a:schemeClr val="tx1"/>
                 </a:solidFill>
-                <a:latin typeface="Century Gothic" panose="020B0502020202020204" pitchFamily="34" charset="0"/>
-                <a:ea typeface="Ubuntu"/>
-                <a:cs typeface="Ubuntu"/>
+                <a:latin typeface="Consolas" panose="020B0609020204030204" pitchFamily="49" charset="0"/>
+                <a:ea typeface="Ubuntu"/>
+                <a:cs typeface="Consolas" panose="020B0609020204030204" pitchFamily="49" charset="0"/>
                 <a:sym typeface="Ubuntu"/>
               </a:rPr>
               <a:t>Image.TSHIRT</a:t>
             </a:r>
           </a:p>
           <a:p>
-            <a:pPr lvl="0" algn="ctr">
+            <a:pPr lvl="0">
               <a:buClr>
                 <a:srgbClr val="003565"/>
               </a:buClr>
@@ -5316,16 +5562,16 @@
                 <a:solidFill>
                   <a:schemeClr val="tx1"/>
                 </a:solidFill>
-                <a:latin typeface="Century Gothic" panose="020B0502020202020204" pitchFamily="34" charset="0"/>
-                <a:ea typeface="Ubuntu"/>
-                <a:cs typeface="Ubuntu"/>
+                <a:latin typeface="Consolas" panose="020B0609020204030204" pitchFamily="49" charset="0"/>
+                <a:ea typeface="Ubuntu"/>
+                <a:cs typeface="Consolas" panose="020B0609020204030204" pitchFamily="49" charset="0"/>
                 <a:sym typeface="Ubuntu"/>
               </a:rPr>
               <a:t>Image.ROLLERSKATE</a:t>
             </a:r>
           </a:p>
           <a:p>
-            <a:pPr lvl="0" algn="ctr">
+            <a:pPr lvl="0">
               <a:buClr>
                 <a:srgbClr val="003565"/>
               </a:buClr>
@@ -5336,16 +5582,16 @@
                 <a:solidFill>
                   <a:schemeClr val="tx1"/>
                 </a:solidFill>
-                <a:latin typeface="Century Gothic" panose="020B0502020202020204" pitchFamily="34" charset="0"/>
-                <a:ea typeface="Ubuntu"/>
-                <a:cs typeface="Ubuntu"/>
+                <a:latin typeface="Consolas" panose="020B0609020204030204" pitchFamily="49" charset="0"/>
+                <a:ea typeface="Ubuntu"/>
+                <a:cs typeface="Consolas" panose="020B0609020204030204" pitchFamily="49" charset="0"/>
                 <a:sym typeface="Ubuntu"/>
               </a:rPr>
               <a:t>Image.DUCK</a:t>
             </a:r>
           </a:p>
           <a:p>
-            <a:pPr lvl="0" algn="ctr">
+            <a:pPr lvl="0">
               <a:buClr>
                 <a:srgbClr val="003565"/>
               </a:buClr>
@@ -5356,16 +5602,16 @@
                 <a:solidFill>
                   <a:schemeClr val="tx1"/>
                 </a:solidFill>
-                <a:latin typeface="Century Gothic" panose="020B0502020202020204" pitchFamily="34" charset="0"/>
-                <a:ea typeface="Ubuntu"/>
-                <a:cs typeface="Ubuntu"/>
+                <a:latin typeface="Consolas" panose="020B0609020204030204" pitchFamily="49" charset="0"/>
+                <a:ea typeface="Ubuntu"/>
+                <a:cs typeface="Consolas" panose="020B0609020204030204" pitchFamily="49" charset="0"/>
                 <a:sym typeface="Ubuntu"/>
               </a:rPr>
               <a:t>Image.HOUSE</a:t>
             </a:r>
           </a:p>
           <a:p>
-            <a:pPr lvl="0" algn="ctr">
+            <a:pPr lvl="0">
               <a:buClr>
                 <a:srgbClr val="003565"/>
               </a:buClr>
@@ -5376,16 +5622,16 @@
                 <a:solidFill>
                   <a:schemeClr val="tx1"/>
                 </a:solidFill>
-                <a:latin typeface="Century Gothic" panose="020B0502020202020204" pitchFamily="34" charset="0"/>
-                <a:ea typeface="Ubuntu"/>
-                <a:cs typeface="Ubuntu"/>
+                <a:latin typeface="Consolas" panose="020B0609020204030204" pitchFamily="49" charset="0"/>
+                <a:ea typeface="Ubuntu"/>
+                <a:cs typeface="Consolas" panose="020B0609020204030204" pitchFamily="49" charset="0"/>
                 <a:sym typeface="Ubuntu"/>
               </a:rPr>
               <a:t>Image.TORTOISE</a:t>
             </a:r>
           </a:p>
           <a:p>
-            <a:pPr lvl="0" algn="ctr">
+            <a:pPr lvl="0">
               <a:buClr>
                 <a:srgbClr val="003565"/>
               </a:buClr>
@@ -5396,16 +5642,16 @@
                 <a:solidFill>
                   <a:schemeClr val="tx1"/>
                 </a:solidFill>
-                <a:latin typeface="Century Gothic" panose="020B0502020202020204" pitchFamily="34" charset="0"/>
-                <a:ea typeface="Ubuntu"/>
-                <a:cs typeface="Ubuntu"/>
+                <a:latin typeface="Consolas" panose="020B0609020204030204" pitchFamily="49" charset="0"/>
+                <a:ea typeface="Ubuntu"/>
+                <a:cs typeface="Consolas" panose="020B0609020204030204" pitchFamily="49" charset="0"/>
                 <a:sym typeface="Ubuntu"/>
               </a:rPr>
               <a:t>Image.BUTTERFLY</a:t>
             </a:r>
           </a:p>
           <a:p>
-            <a:pPr lvl="0" algn="ctr">
+            <a:pPr lvl="0">
               <a:buClr>
                 <a:srgbClr val="003565"/>
               </a:buClr>
@@ -5416,16 +5662,16 @@
                 <a:solidFill>
                   <a:schemeClr val="tx1"/>
                 </a:solidFill>
-                <a:latin typeface="Century Gothic" panose="020B0502020202020204" pitchFamily="34" charset="0"/>
-                <a:ea typeface="Ubuntu"/>
-                <a:cs typeface="Ubuntu"/>
+                <a:latin typeface="Consolas" panose="020B0609020204030204" pitchFamily="49" charset="0"/>
+                <a:ea typeface="Ubuntu"/>
+                <a:cs typeface="Consolas" panose="020B0609020204030204" pitchFamily="49" charset="0"/>
                 <a:sym typeface="Ubuntu"/>
               </a:rPr>
               <a:t>Image.STICKFIGURE</a:t>
             </a:r>
           </a:p>
           <a:p>
-            <a:pPr lvl="0" algn="ctr">
+            <a:pPr lvl="0">
               <a:buClr>
                 <a:srgbClr val="003565"/>
               </a:buClr>
@@ -5436,16 +5682,16 @@
                 <a:solidFill>
                   <a:schemeClr val="tx1"/>
                 </a:solidFill>
-                <a:latin typeface="Century Gothic" panose="020B0502020202020204" pitchFamily="34" charset="0"/>
-                <a:ea typeface="Ubuntu"/>
-                <a:cs typeface="Ubuntu"/>
+                <a:latin typeface="Consolas" panose="020B0609020204030204" pitchFamily="49" charset="0"/>
+                <a:ea typeface="Ubuntu"/>
+                <a:cs typeface="Consolas" panose="020B0609020204030204" pitchFamily="49" charset="0"/>
                 <a:sym typeface="Ubuntu"/>
               </a:rPr>
               <a:t>Image.GHOST</a:t>
             </a:r>
           </a:p>
           <a:p>
-            <a:pPr lvl="0" algn="ctr">
+            <a:pPr lvl="0">
               <a:buClr>
                 <a:srgbClr val="003565"/>
               </a:buClr>
@@ -5456,16 +5702,16 @@
                 <a:solidFill>
                   <a:schemeClr val="tx1"/>
                 </a:solidFill>
-                <a:latin typeface="Century Gothic" panose="020B0502020202020204" pitchFamily="34" charset="0"/>
-                <a:ea typeface="Ubuntu"/>
-                <a:cs typeface="Ubuntu"/>
+                <a:latin typeface="Consolas" panose="020B0609020204030204" pitchFamily="49" charset="0"/>
+                <a:ea typeface="Ubuntu"/>
+                <a:cs typeface="Consolas" panose="020B0609020204030204" pitchFamily="49" charset="0"/>
                 <a:sym typeface="Ubuntu"/>
               </a:rPr>
               <a:t>Image.SWORD</a:t>
             </a:r>
           </a:p>
           <a:p>
-            <a:pPr lvl="0" algn="ctr">
+            <a:pPr lvl="0">
               <a:buClr>
                 <a:srgbClr val="003565"/>
               </a:buClr>
@@ -5476,16 +5722,16 @@
                 <a:solidFill>
                   <a:schemeClr val="tx1"/>
                 </a:solidFill>
-                <a:latin typeface="Century Gothic" panose="020B0502020202020204" pitchFamily="34" charset="0"/>
-                <a:ea typeface="Ubuntu"/>
-                <a:cs typeface="Ubuntu"/>
+                <a:latin typeface="Consolas" panose="020B0609020204030204" pitchFamily="49" charset="0"/>
+                <a:ea typeface="Ubuntu"/>
+                <a:cs typeface="Consolas" panose="020B0609020204030204" pitchFamily="49" charset="0"/>
                 <a:sym typeface="Ubuntu"/>
               </a:rPr>
               <a:t>Image.GIRAFFE</a:t>
             </a:r>
           </a:p>
           <a:p>
-            <a:pPr lvl="0" algn="ctr">
+            <a:pPr lvl="0">
               <a:buClr>
                 <a:srgbClr val="003565"/>
               </a:buClr>
@@ -5496,16 +5742,16 @@
                 <a:solidFill>
                   <a:schemeClr val="tx1"/>
                 </a:solidFill>
-                <a:latin typeface="Century Gothic" panose="020B0502020202020204" pitchFamily="34" charset="0"/>
-                <a:ea typeface="Ubuntu"/>
-                <a:cs typeface="Ubuntu"/>
+                <a:latin typeface="Consolas" panose="020B0609020204030204" pitchFamily="49" charset="0"/>
+                <a:ea typeface="Ubuntu"/>
+                <a:cs typeface="Consolas" panose="020B0609020204030204" pitchFamily="49" charset="0"/>
                 <a:sym typeface="Ubuntu"/>
               </a:rPr>
               <a:t>Image.SKULL</a:t>
             </a:r>
           </a:p>
           <a:p>
-            <a:pPr lvl="0" algn="ctr">
+            <a:pPr lvl="0">
               <a:buClr>
                 <a:srgbClr val="003565"/>
               </a:buClr>
@@ -5516,16 +5762,16 @@
                 <a:solidFill>
                   <a:schemeClr val="tx1"/>
                 </a:solidFill>
-                <a:latin typeface="Century Gothic" panose="020B0502020202020204" pitchFamily="34" charset="0"/>
-                <a:ea typeface="Ubuntu"/>
-                <a:cs typeface="Ubuntu"/>
+                <a:latin typeface="Consolas" panose="020B0609020204030204" pitchFamily="49" charset="0"/>
+                <a:ea typeface="Ubuntu"/>
+                <a:cs typeface="Consolas" panose="020B0609020204030204" pitchFamily="49" charset="0"/>
                 <a:sym typeface="Ubuntu"/>
               </a:rPr>
               <a:t>Image.UMBRELLA</a:t>
             </a:r>
           </a:p>
           <a:p>
-            <a:pPr lvl="0" algn="ctr">
+            <a:pPr lvl="0">
               <a:buClr>
                 <a:srgbClr val="003565"/>
               </a:buClr>
@@ -5536,9 +5782,9 @@
                 <a:solidFill>
                   <a:schemeClr val="tx1"/>
                 </a:solidFill>
-                <a:latin typeface="Century Gothic" panose="020B0502020202020204" pitchFamily="34" charset="0"/>
-                <a:ea typeface="Ubuntu"/>
-                <a:cs typeface="Ubuntu"/>
+                <a:latin typeface="Consolas" panose="020B0609020204030204" pitchFamily="49" charset="0"/>
+                <a:ea typeface="Ubuntu"/>
+                <a:cs typeface="Consolas" panose="020B0609020204030204" pitchFamily="49" charset="0"/>
                 <a:sym typeface="Ubuntu"/>
               </a:rPr>
               <a:t>Image.SNAKE</a:t>
@@ -5577,7 +5823,7 @@
           </a:bodyPr>
           <a:lstStyle/>
           <a:p>
-            <a:pPr lvl="0" algn="ctr">
+            <a:pPr lvl="0">
               <a:buClr>
                 <a:srgbClr val="003565"/>
               </a:buClr>
@@ -5588,52 +5834,68 @@
                 <a:solidFill>
                   <a:schemeClr val="tx1"/>
                 </a:solidFill>
-                <a:latin typeface="Century Gothic" panose="020B0502020202020204" pitchFamily="34" charset="0"/>
-                <a:ea typeface="Ubuntu"/>
-                <a:cs typeface="Ubuntu"/>
-                <a:sym typeface="Ubuntu"/>
-              </a:rPr>
-              <a:t>Image.CLOCK12 # clock at 12 o' clock</a:t>
-            </a:r>
-          </a:p>
-          <a:p>
-            <a:pPr lvl="0" algn="ctr">
+                <a:latin typeface="Consolas" panose="020B0609020204030204" pitchFamily="49" charset="0"/>
+                <a:ea typeface="Ubuntu"/>
+                <a:cs typeface="Consolas" panose="020B0609020204030204" pitchFamily="49" charset="0"/>
+                <a:sym typeface="Ubuntu"/>
+              </a:rPr>
+              <a:t>Image.CLOCK12 </a:t>
+            </a:r>
+            <a:r>
+              <a:rPr lang="en-GB" sz="1600" dirty="0">
+                <a:solidFill>
+                  <a:schemeClr val="tx1"/>
+                </a:solidFill>
+                <a:latin typeface="Atkinson Hyperlegible" pitchFamily="2" charset="0"/>
+                <a:ea typeface="Ubuntu"/>
+                <a:cs typeface="Consolas" panose="020B0609020204030204" pitchFamily="49" charset="0"/>
+                <a:sym typeface="Ubuntu"/>
+              </a:rPr>
+              <a:t>(clock at 12 o' clock, others from 1–11)</a:t>
+            </a:r>
+          </a:p>
+          <a:p>
+            <a:pPr lvl="0">
               <a:buClr>
                 <a:srgbClr val="003565"/>
               </a:buClr>
               <a:buSzPct val="25000"/>
             </a:pPr>
             <a:r>
+              <a:rPr lang="en-GB" sz="1600" dirty="0" err="1">
+                <a:solidFill>
+                  <a:schemeClr val="tx1"/>
+                </a:solidFill>
+                <a:latin typeface="Consolas" panose="020B0609020204030204" pitchFamily="49" charset="0"/>
+                <a:ea typeface="Ubuntu"/>
+                <a:cs typeface="Consolas" panose="020B0609020204030204" pitchFamily="49" charset="0"/>
+                <a:sym typeface="Ubuntu"/>
+              </a:rPr>
+              <a:t>Image.ARROW_N</a:t>
+            </a:r>
+            <a:r>
               <a:rPr lang="en-GB" sz="1600" dirty="0">
                 <a:solidFill>
                   <a:schemeClr val="tx1"/>
                 </a:solidFill>
-                <a:latin typeface="Century Gothic" panose="020B0502020202020204" pitchFamily="34" charset="0"/>
-                <a:ea typeface="Ubuntu"/>
-                <a:cs typeface="Ubuntu"/>
-                <a:sym typeface="Ubuntu"/>
-              </a:rPr>
-              <a:t>Image.ARROW_N</a:t>
-            </a:r>
-          </a:p>
-          <a:p>
-            <a:pPr lvl="0" algn="ctr">
-              <a:buClr>
-                <a:srgbClr val="003565"/>
-              </a:buClr>
-              <a:buSzPct val="25000"/>
-            </a:pPr>
+                <a:latin typeface="Consolas" panose="020B0609020204030204" pitchFamily="49" charset="0"/>
+                <a:ea typeface="Ubuntu"/>
+                <a:cs typeface="Consolas" panose="020B0609020204030204" pitchFamily="49" charset="0"/>
+                <a:sym typeface="Ubuntu"/>
+              </a:rPr>
+              <a:t> </a:t>
+            </a:r>
             <a:r>
               <a:rPr lang="en-GB" sz="1600" dirty="0">
                 <a:solidFill>
                   <a:schemeClr val="tx1"/>
                 </a:solidFill>
-                <a:latin typeface="Century Gothic" panose="020B0502020202020204" pitchFamily="34" charset="0"/>
-                <a:ea typeface="Ubuntu"/>
-                <a:cs typeface="Ubuntu"/>
-                <a:sym typeface="Ubuntu"/>
-              </a:rPr>
-              <a:t>... # arrows pointing N, NE, E, SE, S, SW, W, NW (microbit.Image.ARROW_direction)</a:t>
+                <a:latin typeface="Atkinson Hyperlegible" pitchFamily="2" charset="0"/>
+                <a:ea typeface="Ubuntu"/>
+                <a:cs typeface="Consolas" panose="020B0609020204030204" pitchFamily="49" charset="0"/>
+                <a:sym typeface="Ubuntu"/>
+              </a:rPr>
+              <a:t>(arrow pointing north, others replace N with  NE, E, SE, S, SW, W, NW)</a:t>
             </a:r>
           </a:p>
         </p:txBody>
@@ -5641,7 +5903,7 @@
     </p:spTree>
     <p:extLst>
       <p:ext uri="{BB962C8B-B14F-4D97-AF65-F5344CB8AC3E}">
-        <p14:creationId xmlns:p14="http://schemas.microsoft.com/office/powerpoint/2010/main" val="2542717564"/>
+        <p14:creationId xmlns:p14="http://schemas.microsoft.com/office/powerpoint/2010/main" val="544669978"/>
       </p:ext>
     </p:extLst>
   </p:cSld>
@@ -5703,7 +5965,9 @@
               <a:buNone/>
             </a:pPr>
             <a:r>
-              <a:rPr lang="en-GB" dirty="0"/>
+              <a:rPr lang="en-GB" dirty="0">
+                <a:latin typeface="Atkinson Hyperlegible" pitchFamily="2" charset="0"/>
+              </a:rPr>
               <a:t>Activity 1.3</a:t>
             </a:r>
           </a:p>
@@ -5740,7 +6004,7 @@
           </a:bodyPr>
           <a:lstStyle/>
           <a:p>
-            <a:pPr lvl="0" algn="ctr">
+            <a:pPr lvl="0">
               <a:buClr>
                 <a:srgbClr val="003565"/>
               </a:buClr>
@@ -5751,7 +6015,7 @@
                 <a:solidFill>
                   <a:schemeClr val="tx1"/>
                 </a:solidFill>
-                <a:latin typeface="Century Gothic" panose="020B0502020202020204" pitchFamily="34" charset="0"/>
+                <a:latin typeface="Atkinson Hyperlegible" pitchFamily="2" charset="0"/>
                 <a:ea typeface="Ubuntu"/>
                 <a:cs typeface="Ubuntu"/>
                 <a:sym typeface="Ubuntu"/>
@@ -5792,7 +6056,7 @@
           </a:bodyPr>
           <a:lstStyle/>
           <a:p>
-            <a:pPr lvl="0" algn="ctr">
+            <a:pPr lvl="0">
               <a:buClr>
                 <a:srgbClr val="003565"/>
               </a:buClr>
@@ -5803,7 +6067,7 @@
                 <a:solidFill>
                   <a:schemeClr val="tx1"/>
                 </a:solidFill>
-                <a:latin typeface="Century Gothic" panose="020B0502020202020204" pitchFamily="34" charset="0"/>
+                <a:latin typeface="Atkinson Hyperlegible" pitchFamily="2" charset="0"/>
                 <a:ea typeface="Ubuntu"/>
                 <a:cs typeface="Ubuntu"/>
                 <a:sym typeface="Ubuntu"/>
@@ -5868,7 +6132,7 @@
           </a:bodyPr>
           <a:lstStyle/>
           <a:p>
-            <a:pPr lvl="0" algn="ctr">
+            <a:pPr lvl="0">
               <a:buClr>
                 <a:srgbClr val="003565"/>
               </a:buClr>
@@ -5878,7 +6142,7 @@
               <a:solidFill>
                 <a:schemeClr val="tx1"/>
               </a:solidFill>
-              <a:latin typeface="Century Gothic" panose="020B0502020202020204" pitchFamily="34" charset="0"/>
+              <a:latin typeface="Atkinson Hyperlegible" pitchFamily="2" charset="0"/>
               <a:ea typeface="Ubuntu"/>
               <a:cs typeface="Ubuntu"/>
               <a:sym typeface="Ubuntu"/>
@@ -5951,7 +6215,9 @@
               <a:buNone/>
             </a:pPr>
             <a:r>
-              <a:rPr lang="en-GB" dirty="0"/>
+              <a:rPr lang="en-GB" dirty="0">
+                <a:latin typeface="Atkinson Hyperlegible" pitchFamily="2" charset="0"/>
+              </a:rPr>
               <a:t>Delays</a:t>
             </a:r>
           </a:p>
@@ -5988,7 +6254,7 @@
           </a:bodyPr>
           <a:lstStyle/>
           <a:p>
-            <a:pPr lvl="0" algn="ctr">
+            <a:pPr lvl="0">
               <a:buClr>
                 <a:srgbClr val="003565"/>
               </a:buClr>
@@ -5999,7 +6265,7 @@
                 <a:solidFill>
                   <a:schemeClr val="tx1"/>
                 </a:solidFill>
-                <a:latin typeface="Century Gothic" panose="020B0502020202020204" pitchFamily="34" charset="0"/>
+                <a:latin typeface="Atkinson Hyperlegible" pitchFamily="2" charset="0"/>
                 <a:ea typeface="Ubuntu"/>
                 <a:cs typeface="Ubuntu"/>
                 <a:sym typeface="Ubuntu"/>
@@ -6040,7 +6306,7 @@
           </a:bodyPr>
           <a:lstStyle/>
           <a:p>
-            <a:pPr lvl="0" algn="ctr">
+            <a:pPr lvl="0">
               <a:buClr>
                 <a:srgbClr val="003565"/>
               </a:buClr>
@@ -6051,7 +6317,7 @@
                 <a:solidFill>
                   <a:schemeClr val="tx1"/>
                 </a:solidFill>
-                <a:latin typeface="Century Gothic" panose="020B0502020202020204" pitchFamily="34" charset="0"/>
+                <a:latin typeface="Atkinson Hyperlegible" pitchFamily="2" charset="0"/>
                 <a:ea typeface="Ubuntu"/>
                 <a:cs typeface="Ubuntu"/>
                 <a:sym typeface="Ubuntu"/>
@@ -6092,7 +6358,7 @@
           </a:bodyPr>
           <a:lstStyle/>
           <a:p>
-            <a:pPr lvl="0" algn="ctr">
+            <a:pPr lvl="0">
               <a:buClr>
                 <a:srgbClr val="003565"/>
               </a:buClr>
@@ -6102,7 +6368,7 @@
               <a:solidFill>
                 <a:schemeClr val="tx1"/>
               </a:solidFill>
-              <a:latin typeface="Century Gothic" panose="020B0502020202020204" pitchFamily="34" charset="0"/>
+              <a:latin typeface="Atkinson Hyperlegible" pitchFamily="2" charset="0"/>
               <a:ea typeface="Ubuntu"/>
               <a:cs typeface="Ubuntu"/>
               <a:sym typeface="Ubuntu"/>
@@ -6199,7 +6465,9 @@
               <a:buNone/>
             </a:pPr>
             <a:r>
-              <a:rPr lang="en-GB" dirty="0"/>
+              <a:rPr lang="en-GB" dirty="0">
+                <a:latin typeface="Atkinson Hyperlegible" pitchFamily="2" charset="0"/>
+              </a:rPr>
               <a:t>Activity 1.4</a:t>
             </a:r>
           </a:p>
@@ -6236,7 +6504,7 @@
           </a:bodyPr>
           <a:lstStyle/>
           <a:p>
-            <a:pPr lvl="0" algn="ctr">
+            <a:pPr lvl="0">
               <a:buClr>
                 <a:srgbClr val="003565"/>
               </a:buClr>
@@ -6247,7 +6515,7 @@
                 <a:solidFill>
                   <a:schemeClr val="tx1"/>
                 </a:solidFill>
-                <a:latin typeface="Century Gothic" panose="020B0502020202020204" pitchFamily="34" charset="0"/>
+                <a:latin typeface="Atkinson Hyperlegible" pitchFamily="2" charset="0"/>
                 <a:ea typeface="Ubuntu"/>
                 <a:cs typeface="Ubuntu"/>
                 <a:sym typeface="Ubuntu"/>
@@ -6288,7 +6556,7 @@
           </a:bodyPr>
           <a:lstStyle/>
           <a:p>
-            <a:pPr lvl="0" algn="ctr">
+            <a:pPr lvl="0">
               <a:buClr>
                 <a:srgbClr val="003565"/>
               </a:buClr>
@@ -6299,7 +6567,7 @@
                 <a:solidFill>
                   <a:schemeClr val="tx1"/>
                 </a:solidFill>
-                <a:latin typeface="Century Gothic" panose="020B0502020202020204" pitchFamily="34" charset="0"/>
+                <a:latin typeface="Atkinson Hyperlegible" pitchFamily="2" charset="0"/>
                 <a:ea typeface="Ubuntu"/>
                 <a:cs typeface="Ubuntu"/>
                 <a:sym typeface="Ubuntu"/>
@@ -6364,7 +6632,7 @@
           </a:bodyPr>
           <a:lstStyle/>
           <a:p>
-            <a:pPr lvl="0" algn="ctr">
+            <a:pPr lvl="0">
               <a:buClr>
                 <a:srgbClr val="003565"/>
               </a:buClr>
@@ -6374,7 +6642,7 @@
               <a:solidFill>
                 <a:schemeClr val="tx1"/>
               </a:solidFill>
-              <a:latin typeface="Century Gothic" panose="020B0502020202020204" pitchFamily="34" charset="0"/>
+              <a:latin typeface="Atkinson Hyperlegible" pitchFamily="2" charset="0"/>
               <a:ea typeface="Ubuntu"/>
               <a:cs typeface="Ubuntu"/>
               <a:sym typeface="Ubuntu"/>
@@ -6413,7 +6681,7 @@
           </a:bodyPr>
           <a:lstStyle/>
           <a:p>
-            <a:pPr lvl="0" algn="ctr">
+            <a:pPr lvl="0">
               <a:buClr>
                 <a:srgbClr val="003565"/>
               </a:buClr>
@@ -6424,7 +6692,7 @@
                 <a:solidFill>
                   <a:schemeClr val="tx1"/>
                 </a:solidFill>
-                <a:latin typeface="Century Gothic" panose="020B0502020202020204" pitchFamily="34" charset="0"/>
+                <a:latin typeface="Atkinson Hyperlegible" pitchFamily="2" charset="0"/>
                 <a:ea typeface="Ubuntu"/>
                 <a:cs typeface="Ubuntu"/>
                 <a:sym typeface="Ubuntu"/>
@@ -6499,7 +6767,9 @@
               <a:buNone/>
             </a:pPr>
             <a:r>
-              <a:rPr lang="en-GB" dirty="0"/>
+              <a:rPr lang="en-GB" dirty="0">
+                <a:latin typeface="Atkinson Hyperlegible" pitchFamily="2" charset="0"/>
+              </a:rPr>
               <a:t>What is it?</a:t>
             </a:r>
           </a:p>
@@ -6536,7 +6806,7 @@
           </a:bodyPr>
           <a:lstStyle/>
           <a:p>
-            <a:pPr lvl="0" algn="ctr">
+            <a:pPr lvl="0">
               <a:buClr>
                 <a:srgbClr val="003565"/>
               </a:buClr>
@@ -6547,7 +6817,7 @@
                 <a:solidFill>
                   <a:schemeClr val="tx1"/>
                 </a:solidFill>
-                <a:latin typeface="Century Gothic" panose="020B0502020202020204" pitchFamily="34" charset="0"/>
+                <a:latin typeface="Atkinson Hyperlegible" pitchFamily="2" charset="0"/>
                 <a:ea typeface="Ubuntu"/>
                 <a:cs typeface="Ubuntu"/>
                 <a:sym typeface="Ubuntu"/>
@@ -6588,7 +6858,7 @@
           </a:bodyPr>
           <a:lstStyle/>
           <a:p>
-            <a:pPr lvl="0" algn="ctr">
+            <a:pPr lvl="0">
               <a:buClr>
                 <a:srgbClr val="003565"/>
               </a:buClr>
@@ -6599,7 +6869,7 @@
                 <a:solidFill>
                   <a:schemeClr val="tx1"/>
                 </a:solidFill>
-                <a:latin typeface="Century Gothic" panose="020B0502020202020204" pitchFamily="34" charset="0"/>
+                <a:latin typeface="Atkinson Hyperlegible" pitchFamily="2" charset="0"/>
                 <a:ea typeface="Ubuntu"/>
                 <a:cs typeface="Ubuntu"/>
                 <a:sym typeface="Ubuntu"/>
@@ -6797,7 +7067,9 @@
               <a:buNone/>
             </a:pPr>
             <a:r>
-              <a:rPr lang="en-GB" dirty="0"/>
+              <a:rPr lang="en-GB" dirty="0">
+                <a:latin typeface="Atkinson Hyperlegible" pitchFamily="2" charset="0"/>
+              </a:rPr>
               <a:t>Algorithms</a:t>
             </a:r>
           </a:p>
@@ -6834,7 +7106,7 @@
           </a:bodyPr>
           <a:lstStyle/>
           <a:p>
-            <a:pPr lvl="0" algn="ctr">
+            <a:pPr lvl="0">
               <a:buClr>
                 <a:srgbClr val="003565"/>
               </a:buClr>
@@ -6845,7 +7117,7 @@
                 <a:solidFill>
                   <a:schemeClr val="tx1"/>
                 </a:solidFill>
-                <a:latin typeface="Century Gothic" panose="020B0502020202020204" pitchFamily="34" charset="0"/>
+                <a:latin typeface="Atkinson Hyperlegible" pitchFamily="2" charset="0"/>
                 <a:ea typeface="Ubuntu"/>
                 <a:cs typeface="Ubuntu"/>
                 <a:sym typeface="Ubuntu"/>
@@ -6904,7 +7176,7 @@
                 <a:solidFill>
                   <a:schemeClr val="bg1"/>
                 </a:solidFill>
-                <a:latin typeface="Century Gothic" panose="020B0502020202020204" pitchFamily="34" charset="0"/>
+                <a:latin typeface="Atkinson Hyperlegible" pitchFamily="2" charset="0"/>
               </a:rPr>
               <a:t>Start</a:t>
             </a:r>
@@ -6960,7 +7232,7 @@
                 <a:solidFill>
                   <a:schemeClr val="bg1"/>
                 </a:solidFill>
-                <a:latin typeface="Century Gothic" panose="020B0502020202020204" pitchFamily="34" charset="0"/>
+                <a:latin typeface="Atkinson Hyperlegible" pitchFamily="2" charset="0"/>
               </a:rPr>
               <a:t>End</a:t>
             </a:r>
@@ -7090,7 +7362,7 @@
             <a:pPr algn="ctr"/>
             <a:r>
               <a:rPr lang="en-GB" dirty="0">
-                <a:latin typeface="Century Gothic" panose="020B0502020202020204" pitchFamily="34" charset="0"/>
+                <a:latin typeface="Atkinson Hyperlegible" pitchFamily="2" charset="0"/>
               </a:rPr>
               <a:t>Slice the bread</a:t>
             </a:r>
@@ -7143,7 +7415,7 @@
             <a:pPr algn="ctr"/>
             <a:r>
               <a:rPr lang="en-GB" dirty="0">
-                <a:latin typeface="Century Gothic" panose="020B0502020202020204" pitchFamily="34" charset="0"/>
+                <a:latin typeface="Atkinson Hyperlegible" pitchFamily="2" charset="0"/>
               </a:rPr>
               <a:t>Toast the bread</a:t>
             </a:r>
@@ -7234,7 +7506,7 @@
             <a:pPr algn="ctr"/>
             <a:r>
               <a:rPr lang="en-GB" dirty="0">
-                <a:latin typeface="Century Gothic" panose="020B0502020202020204" pitchFamily="34" charset="0"/>
+                <a:latin typeface="Atkinson Hyperlegible" pitchFamily="2" charset="0"/>
               </a:rPr>
               <a:t>Butter the toast</a:t>
             </a:r>
@@ -7325,7 +7597,7 @@
             <a:pPr algn="ctr"/>
             <a:r>
               <a:rPr lang="en-GB" dirty="0">
-                <a:latin typeface="Century Gothic" panose="020B0502020202020204" pitchFamily="34" charset="0"/>
+                <a:latin typeface="Atkinson Hyperlegible" pitchFamily="2" charset="0"/>
               </a:rPr>
               <a:t>Spread the jam</a:t>
             </a:r>
@@ -7402,7 +7674,7 @@
           </a:bodyPr>
           <a:lstStyle/>
           <a:p>
-            <a:pPr lvl="0" algn="ctr">
+            <a:pPr lvl="0">
               <a:buClr>
                 <a:srgbClr val="003565"/>
               </a:buClr>
@@ -7413,7 +7685,7 @@
                 <a:solidFill>
                   <a:schemeClr val="tx1"/>
                 </a:solidFill>
-                <a:latin typeface="Century Gothic" panose="020B0502020202020204" pitchFamily="34" charset="0"/>
+                <a:latin typeface="Atkinson Hyperlegible" pitchFamily="2" charset="0"/>
                 <a:ea typeface="Ubuntu"/>
                 <a:cs typeface="Ubuntu"/>
                 <a:sym typeface="Ubuntu"/>
@@ -7529,7 +7801,9 @@
               <a:buNone/>
             </a:pPr>
             <a:r>
-              <a:rPr lang="en-GB" dirty="0"/>
+              <a:rPr lang="en-GB" dirty="0">
+                <a:latin typeface="Atkinson Hyperlegible" pitchFamily="2" charset="0"/>
+              </a:rPr>
               <a:t>Sequencing</a:t>
             </a:r>
           </a:p>
@@ -7566,7 +7840,7 @@
           </a:bodyPr>
           <a:lstStyle/>
           <a:p>
-            <a:pPr lvl="0" algn="ctr">
+            <a:pPr lvl="0">
               <a:buClr>
                 <a:srgbClr val="003565"/>
               </a:buClr>
@@ -7577,7 +7851,7 @@
                 <a:solidFill>
                   <a:schemeClr val="tx1"/>
                 </a:solidFill>
-                <a:latin typeface="Century Gothic" panose="020B0502020202020204" pitchFamily="34" charset="0"/>
+                <a:latin typeface="Atkinson Hyperlegible" pitchFamily="2" charset="0"/>
                 <a:ea typeface="Ubuntu"/>
                 <a:cs typeface="Ubuntu"/>
                 <a:sym typeface="Ubuntu"/>
@@ -7636,7 +7910,7 @@
                 <a:solidFill>
                   <a:schemeClr val="bg1"/>
                 </a:solidFill>
-                <a:latin typeface="Century Gothic" panose="020B0502020202020204" pitchFamily="34" charset="0"/>
+                <a:latin typeface="Atkinson Hyperlegible" pitchFamily="2" charset="0"/>
               </a:rPr>
               <a:t>Start</a:t>
             </a:r>
@@ -7692,7 +7966,7 @@
                 <a:solidFill>
                   <a:schemeClr val="bg1"/>
                 </a:solidFill>
-                <a:latin typeface="Century Gothic" panose="020B0502020202020204" pitchFamily="34" charset="0"/>
+                <a:latin typeface="Atkinson Hyperlegible" pitchFamily="2" charset="0"/>
               </a:rPr>
               <a:t>End</a:t>
             </a:r>
@@ -7889,7 +8163,7 @@
             <a:pPr algn="ctr"/>
             <a:r>
               <a:rPr lang="en-GB" dirty="0">
-                <a:latin typeface="Century Gothic" panose="020B0502020202020204" pitchFamily="34" charset="0"/>
+                <a:latin typeface="Atkinson Hyperlegible" pitchFamily="2" charset="0"/>
               </a:rPr>
               <a:t>Display “Computer”</a:t>
             </a:r>
@@ -7942,7 +8216,7 @@
             <a:pPr algn="ctr"/>
             <a:r>
               <a:rPr lang="en-GB" dirty="0">
-                <a:latin typeface="Century Gothic" panose="020B0502020202020204" pitchFamily="34" charset="0"/>
+                <a:latin typeface="Atkinson Hyperlegible" pitchFamily="2" charset="0"/>
               </a:rPr>
               <a:t>Display “Science”</a:t>
             </a:r>
@@ -7995,7 +8269,7 @@
             <a:pPr algn="ctr"/>
             <a:r>
               <a:rPr lang="en-GB" dirty="0">
-                <a:latin typeface="Century Gothic" panose="020B0502020202020204" pitchFamily="34" charset="0"/>
+                <a:latin typeface="Atkinson Hyperlegible" pitchFamily="2" charset="0"/>
               </a:rPr>
               <a:t>Display “Rocks”</a:t>
             </a:r>
@@ -8033,7 +8307,7 @@
           </a:bodyPr>
           <a:lstStyle/>
           <a:p>
-            <a:pPr lvl="0" algn="ctr">
+            <a:pPr lvl="0">
               <a:buClr>
                 <a:srgbClr val="003565"/>
               </a:buClr>
@@ -8044,7 +8318,7 @@
                 <a:solidFill>
                   <a:schemeClr val="tx1"/>
                 </a:solidFill>
-                <a:latin typeface="Century Gothic" panose="020B0502020202020204" pitchFamily="34" charset="0"/>
+                <a:latin typeface="Atkinson Hyperlegible" pitchFamily="2" charset="0"/>
                 <a:ea typeface="Ubuntu"/>
                 <a:cs typeface="Ubuntu"/>
                 <a:sym typeface="Ubuntu"/>
@@ -8085,7 +8359,7 @@
           </a:bodyPr>
           <a:lstStyle/>
           <a:p>
-            <a:pPr lvl="0" algn="ctr">
+            <a:pPr lvl="0">
               <a:buClr>
                 <a:srgbClr val="003565"/>
               </a:buClr>
@@ -8096,7 +8370,7 @@
                 <a:solidFill>
                   <a:schemeClr val="tx1"/>
                 </a:solidFill>
-                <a:latin typeface="Century Gothic" panose="020B0502020202020204" pitchFamily="34" charset="0"/>
+                <a:latin typeface="Atkinson Hyperlegible" pitchFamily="2" charset="0"/>
                 <a:ea typeface="Ubuntu"/>
                 <a:cs typeface="Ubuntu"/>
                 <a:sym typeface="Ubuntu"/>
@@ -8137,7 +8411,7 @@
           </a:bodyPr>
           <a:lstStyle/>
           <a:p>
-            <a:pPr lvl="0" algn="ctr">
+            <a:pPr lvl="0">
               <a:buClr>
                 <a:srgbClr val="003565"/>
               </a:buClr>
@@ -8148,7 +8422,7 @@
                 <a:solidFill>
                   <a:schemeClr val="tx1"/>
                 </a:solidFill>
-                <a:latin typeface="Century Gothic" panose="020B0502020202020204" pitchFamily="34" charset="0"/>
+                <a:latin typeface="Atkinson Hyperlegible" pitchFamily="2" charset="0"/>
                 <a:ea typeface="Ubuntu"/>
                 <a:cs typeface="Ubuntu"/>
                 <a:sym typeface="Ubuntu"/>
@@ -8218,7 +8492,9 @@
               <a:buNone/>
             </a:pPr>
             <a:r>
-              <a:rPr lang="en-GB" dirty="0"/>
+              <a:rPr lang="en-GB" dirty="0">
+                <a:latin typeface="Atkinson Hyperlegible" pitchFamily="2" charset="0"/>
+              </a:rPr>
               <a:t>Activity 1.1</a:t>
             </a:r>
           </a:p>
@@ -8273,7 +8549,7 @@
                 <a:solidFill>
                   <a:schemeClr val="bg1"/>
                 </a:solidFill>
-                <a:latin typeface="Century Gothic" panose="020B0502020202020204" pitchFamily="34" charset="0"/>
+                <a:latin typeface="Atkinson Hyperlegible" pitchFamily="2" charset="0"/>
               </a:rPr>
               <a:t>Start</a:t>
             </a:r>
@@ -8329,7 +8605,7 @@
                 <a:solidFill>
                   <a:schemeClr val="bg1"/>
                 </a:solidFill>
-                <a:latin typeface="Century Gothic" panose="020B0502020202020204" pitchFamily="34" charset="0"/>
+                <a:latin typeface="Atkinson Hyperlegible" pitchFamily="2" charset="0"/>
               </a:rPr>
               <a:t>End</a:t>
             </a:r>
@@ -8526,7 +8802,7 @@
             <a:pPr algn="ctr"/>
             <a:r>
               <a:rPr lang="en-GB" dirty="0">
-                <a:latin typeface="Century Gothic" panose="020B0502020202020204" pitchFamily="34" charset="0"/>
+                <a:latin typeface="Atkinson Hyperlegible" pitchFamily="2" charset="0"/>
               </a:rPr>
               <a:t>Display “Computer”</a:t>
             </a:r>
@@ -8579,7 +8855,7 @@
             <a:pPr algn="ctr"/>
             <a:r>
               <a:rPr lang="en-GB" dirty="0">
-                <a:latin typeface="Century Gothic" panose="020B0502020202020204" pitchFamily="34" charset="0"/>
+                <a:latin typeface="Atkinson Hyperlegible" pitchFamily="2" charset="0"/>
               </a:rPr>
               <a:t>Display “Science”</a:t>
             </a:r>
@@ -8632,7 +8908,7 @@
             <a:pPr algn="ctr"/>
             <a:r>
               <a:rPr lang="en-GB" dirty="0">
-                <a:latin typeface="Century Gothic" panose="020B0502020202020204" pitchFamily="34" charset="0"/>
+                <a:latin typeface="Atkinson Hyperlegible" pitchFamily="2" charset="0"/>
               </a:rPr>
               <a:t>Display “Rocks”</a:t>
             </a:r>
@@ -8670,7 +8946,7 @@
           </a:bodyPr>
           <a:lstStyle/>
           <a:p>
-            <a:pPr lvl="0" algn="ctr">
+            <a:pPr lvl="0">
               <a:buClr>
                 <a:srgbClr val="003565"/>
               </a:buClr>
@@ -8681,7 +8957,7 @@
                 <a:solidFill>
                   <a:schemeClr val="tx1"/>
                 </a:solidFill>
-                <a:latin typeface="Century Gothic" panose="020B0502020202020204" pitchFamily="34" charset="0"/>
+                <a:latin typeface="Atkinson Hyperlegible" pitchFamily="2" charset="0"/>
                 <a:ea typeface="Ubuntu"/>
                 <a:cs typeface="Ubuntu"/>
                 <a:sym typeface="Ubuntu"/>
@@ -8828,7 +9104,9 @@
               <a:buNone/>
             </a:pPr>
             <a:r>
-              <a:rPr lang="en-GB" dirty="0"/>
+              <a:rPr lang="en-GB" dirty="0">
+                <a:latin typeface="Atkinson Hyperlegible" pitchFamily="2" charset="0"/>
+              </a:rPr>
               <a:t>Mu Editor</a:t>
             </a:r>
           </a:p>
@@ -8893,7 +9171,7 @@
           </a:bodyPr>
           <a:lstStyle/>
           <a:p>
-            <a:pPr lvl="0" algn="ctr">
+            <a:pPr lvl="0">
               <a:buClr>
                 <a:srgbClr val="003565"/>
               </a:buClr>
@@ -8904,7 +9182,7 @@
                 <a:solidFill>
                   <a:schemeClr val="tx1"/>
                 </a:solidFill>
-                <a:latin typeface="Century Gothic" panose="020B0502020202020204" pitchFamily="34" charset="0"/>
+                <a:latin typeface="Atkinson Hyperlegible" pitchFamily="2" charset="0"/>
                 <a:ea typeface="Ubuntu"/>
                 <a:cs typeface="Ubuntu"/>
                 <a:sym typeface="Ubuntu"/>
@@ -8947,7 +9225,7 @@
           </a:bodyPr>
           <a:lstStyle/>
           <a:p>
-            <a:pPr lvl="0" algn="ctr">
+            <a:pPr lvl="0">
               <a:buClr>
                 <a:srgbClr val="003565"/>
               </a:buClr>
@@ -8958,7 +9236,7 @@
                 <a:solidFill>
                   <a:schemeClr val="tx1"/>
                 </a:solidFill>
-                <a:latin typeface="Century Gothic" panose="020B0502020202020204" pitchFamily="34" charset="0"/>
+                <a:latin typeface="Atkinson Hyperlegible" pitchFamily="2" charset="0"/>
                 <a:ea typeface="Ubuntu"/>
                 <a:cs typeface="Ubuntu"/>
                 <a:sym typeface="Ubuntu"/>
@@ -9039,7 +9317,7 @@
           </a:bodyPr>
           <a:lstStyle/>
           <a:p>
-            <a:pPr lvl="0" algn="ctr">
+            <a:pPr lvl="0">
               <a:buClr>
                 <a:srgbClr val="003565"/>
               </a:buClr>
@@ -9050,12 +9328,36 @@
                 <a:solidFill>
                   <a:schemeClr val="tx1"/>
                 </a:solidFill>
-                <a:latin typeface="Century Gothic" panose="020B0502020202020204" pitchFamily="34" charset="0"/>
+                <a:latin typeface="Atkinson Hyperlegible" pitchFamily="2" charset="0"/>
                 <a:ea typeface="Ubuntu"/>
                 <a:cs typeface="Ubuntu"/>
                 <a:sym typeface="Ubuntu"/>
               </a:rPr>
-              <a:t>Click this button to load your program onto your micro:bit </a:t>
+              <a:t>Click this button to load your program onto your </a:t>
+            </a:r>
+            <a:r>
+              <a:rPr lang="en-GB" sz="1600" dirty="0" err="1">
+                <a:solidFill>
+                  <a:schemeClr val="tx1"/>
+                </a:solidFill>
+                <a:latin typeface="Atkinson Hyperlegible" pitchFamily="2" charset="0"/>
+                <a:ea typeface="Ubuntu"/>
+                <a:cs typeface="Ubuntu"/>
+                <a:sym typeface="Ubuntu"/>
+              </a:rPr>
+              <a:t>micro:bit</a:t>
+            </a:r>
+            <a:r>
+              <a:rPr lang="en-GB" sz="1600" dirty="0">
+                <a:solidFill>
+                  <a:schemeClr val="tx1"/>
+                </a:solidFill>
+                <a:latin typeface="Atkinson Hyperlegible" pitchFamily="2" charset="0"/>
+                <a:ea typeface="Ubuntu"/>
+                <a:cs typeface="Ubuntu"/>
+                <a:sym typeface="Ubuntu"/>
+              </a:rPr>
+              <a:t>. </a:t>
             </a:r>
           </a:p>
         </p:txBody>
@@ -9131,7 +9433,7 @@
           </a:bodyPr>
           <a:lstStyle/>
           <a:p>
-            <a:pPr lvl="0" algn="ctr">
+            <a:pPr lvl="0">
               <a:buClr>
                 <a:srgbClr val="003565"/>
               </a:buClr>
@@ -9142,7 +9444,7 @@
                 <a:solidFill>
                   <a:schemeClr val="tx1"/>
                 </a:solidFill>
-                <a:latin typeface="Century Gothic" panose="020B0502020202020204" pitchFamily="34" charset="0"/>
+                <a:latin typeface="Atkinson Hyperlegible" pitchFamily="2" charset="0"/>
                 <a:ea typeface="Ubuntu"/>
                 <a:cs typeface="Ubuntu"/>
                 <a:sym typeface="Ubuntu"/>
@@ -9255,7 +9557,9 @@
               <a:buNone/>
             </a:pPr>
             <a:r>
-              <a:rPr lang="en-GB" dirty="0"/>
+              <a:rPr lang="en-GB" dirty="0">
+                <a:latin typeface="Atkinson Hyperlegible" pitchFamily="2" charset="0"/>
+              </a:rPr>
               <a:t>Displaying Text</a:t>
             </a:r>
           </a:p>
@@ -9292,7 +9596,7 @@
           </a:bodyPr>
           <a:lstStyle/>
           <a:p>
-            <a:pPr lvl="0" algn="ctr">
+            <a:pPr lvl="0">
               <a:buClr>
                 <a:srgbClr val="003565"/>
               </a:buClr>
@@ -9303,7 +9607,7 @@
                 <a:solidFill>
                   <a:schemeClr val="tx1"/>
                 </a:solidFill>
-                <a:latin typeface="Century Gothic" panose="020B0502020202020204" pitchFamily="34" charset="0"/>
+                <a:latin typeface="Atkinson Hyperlegible" pitchFamily="2" charset="0"/>
                 <a:ea typeface="Ubuntu"/>
                 <a:cs typeface="Ubuntu"/>
                 <a:sym typeface="Ubuntu"/>
@@ -9315,7 +9619,7 @@
                 <a:solidFill>
                   <a:schemeClr val="tx1"/>
                 </a:solidFill>
-                <a:latin typeface="Century Gothic" panose="020B0502020202020204" pitchFamily="34" charset="0"/>
+                <a:latin typeface="Atkinson Hyperlegible" pitchFamily="2" charset="0"/>
                 <a:ea typeface="Ubuntu"/>
                 <a:cs typeface="Ubuntu"/>
                 <a:sym typeface="Ubuntu"/>
@@ -9327,7 +9631,7 @@
                 <a:solidFill>
                   <a:schemeClr val="tx1"/>
                 </a:solidFill>
-                <a:latin typeface="Century Gothic" panose="020B0502020202020204" pitchFamily="34" charset="0"/>
+                <a:latin typeface="Atkinson Hyperlegible" pitchFamily="2" charset="0"/>
                 <a:ea typeface="Ubuntu"/>
                 <a:cs typeface="Ubuntu"/>
                 <a:sym typeface="Ubuntu"/>
@@ -9368,7 +9672,7 @@
           </a:bodyPr>
           <a:lstStyle/>
           <a:p>
-            <a:pPr lvl="0" algn="ctr">
+            <a:pPr lvl="0">
               <a:buClr>
                 <a:srgbClr val="003565"/>
               </a:buClr>
@@ -9379,7 +9683,7 @@
                 <a:solidFill>
                   <a:schemeClr val="tx1"/>
                 </a:solidFill>
-                <a:latin typeface="Century Gothic" panose="020B0502020202020204" pitchFamily="34" charset="0"/>
+                <a:latin typeface="Atkinson Hyperlegible" pitchFamily="2" charset="0"/>
                 <a:ea typeface="Ubuntu"/>
                 <a:cs typeface="Ubuntu"/>
                 <a:sym typeface="Ubuntu"/>
@@ -9420,7 +9724,7 @@
           </a:bodyPr>
           <a:lstStyle/>
           <a:p>
-            <a:pPr lvl="0" algn="ctr">
+            <a:pPr lvl="0">
               <a:buClr>
                 <a:srgbClr val="003565"/>
               </a:buClr>
@@ -9430,7 +9734,7 @@
               <a:solidFill>
                 <a:schemeClr val="tx1"/>
               </a:solidFill>
-              <a:latin typeface="Century Gothic" panose="020B0502020202020204" pitchFamily="34" charset="0"/>
+              <a:latin typeface="Atkinson Hyperlegible" pitchFamily="2" charset="0"/>
               <a:ea typeface="Ubuntu"/>
               <a:cs typeface="Ubuntu"/>
               <a:sym typeface="Ubuntu"/>
@@ -9527,7 +9831,9 @@
               <a:buNone/>
             </a:pPr>
             <a:r>
-              <a:rPr lang="en-GB" dirty="0"/>
+              <a:rPr lang="en-GB" dirty="0">
+                <a:latin typeface="Atkinson Hyperlegible" pitchFamily="2" charset="0"/>
+              </a:rPr>
               <a:t>Activity 1.2</a:t>
             </a:r>
           </a:p>
@@ -9564,7 +9870,7 @@
           </a:bodyPr>
           <a:lstStyle/>
           <a:p>
-            <a:pPr lvl="0" algn="ctr">
+            <a:pPr lvl="0">
               <a:buClr>
                 <a:srgbClr val="003565"/>
               </a:buClr>
@@ -9575,7 +9881,7 @@
                 <a:solidFill>
                   <a:schemeClr val="tx1"/>
                 </a:solidFill>
-                <a:latin typeface="Century Gothic" panose="020B0502020202020204" pitchFamily="34" charset="0"/>
+                <a:latin typeface="Atkinson Hyperlegible" pitchFamily="2" charset="0"/>
                 <a:ea typeface="Ubuntu"/>
                 <a:cs typeface="Ubuntu"/>
                 <a:sym typeface="Ubuntu"/>
@@ -9616,7 +9922,7 @@
           </a:bodyPr>
           <a:lstStyle/>
           <a:p>
-            <a:pPr lvl="0" algn="ctr">
+            <a:pPr lvl="0">
               <a:buClr>
                 <a:srgbClr val="003565"/>
               </a:buClr>
@@ -9627,7 +9933,7 @@
                 <a:solidFill>
                   <a:schemeClr val="tx1"/>
                 </a:solidFill>
-                <a:latin typeface="Century Gothic" panose="020B0502020202020204" pitchFamily="34" charset="0"/>
+                <a:latin typeface="Atkinson Hyperlegible" pitchFamily="2" charset="0"/>
                 <a:ea typeface="Ubuntu"/>
                 <a:cs typeface="Ubuntu"/>
                 <a:sym typeface="Ubuntu"/>
@@ -9692,7 +9998,7 @@
           </a:bodyPr>
           <a:lstStyle/>
           <a:p>
-            <a:pPr lvl="0" algn="ctr">
+            <a:pPr lvl="0">
               <a:buClr>
                 <a:srgbClr val="003565"/>
               </a:buClr>
@@ -9702,7 +10008,7 @@
               <a:solidFill>
                 <a:schemeClr val="tx1"/>
               </a:solidFill>
-              <a:latin typeface="Century Gothic" panose="020B0502020202020204" pitchFamily="34" charset="0"/>
+              <a:latin typeface="Atkinson Hyperlegible" pitchFamily="2" charset="0"/>
               <a:ea typeface="Ubuntu"/>
               <a:cs typeface="Ubuntu"/>
               <a:sym typeface="Ubuntu"/>
@@ -9775,7 +10081,9 @@
               <a:buNone/>
             </a:pPr>
             <a:r>
-              <a:rPr lang="en-GB" dirty="0"/>
+              <a:rPr lang="en-GB" dirty="0">
+                <a:latin typeface="Atkinson Hyperlegible" pitchFamily="2" charset="0"/>
+              </a:rPr>
               <a:t>Images</a:t>
             </a:r>
           </a:p>
@@ -9812,7 +10120,7 @@
           </a:bodyPr>
           <a:lstStyle/>
           <a:p>
-            <a:pPr lvl="0" algn="ctr">
+            <a:pPr lvl="0">
               <a:buClr>
                 <a:srgbClr val="003565"/>
               </a:buClr>
@@ -9823,7 +10131,7 @@
                 <a:solidFill>
                   <a:schemeClr val="tx1"/>
                 </a:solidFill>
-                <a:latin typeface="Century Gothic" panose="020B0502020202020204" pitchFamily="34" charset="0"/>
+                <a:latin typeface="Atkinson Hyperlegible" pitchFamily="2" charset="0"/>
                 <a:ea typeface="Ubuntu"/>
                 <a:cs typeface="Ubuntu"/>
                 <a:sym typeface="Ubuntu"/>
@@ -9835,7 +10143,7 @@
                 <a:solidFill>
                   <a:schemeClr val="tx1"/>
                 </a:solidFill>
-                <a:latin typeface="Century Gothic" panose="020B0502020202020204" pitchFamily="34" charset="0"/>
+                <a:latin typeface="Atkinson Hyperlegible" pitchFamily="2" charset="0"/>
                 <a:ea typeface="Ubuntu"/>
                 <a:cs typeface="Ubuntu"/>
                 <a:sym typeface="Ubuntu"/>
@@ -9900,7 +10208,7 @@
           </a:bodyPr>
           <a:lstStyle/>
           <a:p>
-            <a:pPr lvl="0" algn="ctr">
+            <a:pPr lvl="0">
               <a:buClr>
                 <a:srgbClr val="003565"/>
               </a:buClr>
@@ -9911,7 +10219,7 @@
                 <a:solidFill>
                   <a:schemeClr val="tx1"/>
                 </a:solidFill>
-                <a:latin typeface="Century Gothic" panose="020B0502020202020204" pitchFamily="34" charset="0"/>
+                <a:latin typeface="Atkinson Hyperlegible" pitchFamily="2" charset="0"/>
                 <a:ea typeface="Ubuntu"/>
                 <a:cs typeface="Ubuntu"/>
                 <a:sym typeface="Ubuntu"/>
@@ -9952,7 +10260,7 @@
           </a:bodyPr>
           <a:lstStyle/>
           <a:p>
-            <a:pPr lvl="0" algn="ctr">
+            <a:pPr lvl="0">
               <a:buClr>
                 <a:srgbClr val="003565"/>
               </a:buClr>
@@ -9962,7 +10270,7 @@
               <a:solidFill>
                 <a:schemeClr val="tx1"/>
               </a:solidFill>
-              <a:latin typeface="Century Gothic" panose="020B0502020202020204" pitchFamily="34" charset="0"/>
+              <a:latin typeface="Atkinson Hyperlegible" pitchFamily="2" charset="0"/>
               <a:ea typeface="Ubuntu"/>
               <a:cs typeface="Ubuntu"/>
               <a:sym typeface="Ubuntu"/>

</xml_diff>